<commit_message>
joane - final ppt?
</commit_message>
<xml_diff>
--- a/joane/Redefense/Capstone 1_JML.pptx
+++ b/joane/Redefense/Capstone 1_JML.pptx
@@ -5,7 +5,7 @@
     <p:sldMasterId id="2147483696" r:id="rId1"/>
   </p:sldMasterIdLst>
   <p:notesMasterIdLst>
-    <p:notesMasterId r:id="rId19"/>
+    <p:notesMasterId r:id="rId23"/>
   </p:notesMasterIdLst>
   <p:sldIdLst>
     <p:sldId id="256" r:id="rId2"/>
@@ -23,8 +23,12 @@
     <p:sldId id="271" r:id="rId14"/>
     <p:sldId id="270" r:id="rId15"/>
     <p:sldId id="272" r:id="rId16"/>
-    <p:sldId id="267" r:id="rId17"/>
-    <p:sldId id="264" r:id="rId18"/>
+    <p:sldId id="275" r:id="rId17"/>
+    <p:sldId id="273" r:id="rId18"/>
+    <p:sldId id="267" r:id="rId19"/>
+    <p:sldId id="264" r:id="rId20"/>
+    <p:sldId id="277" r:id="rId21"/>
+    <p:sldId id="276" r:id="rId22"/>
   </p:sldIdLst>
   <p:sldSz cx="12192000" cy="6858000"/>
   <p:notesSz cx="6858000" cy="9144000"/>
@@ -213,7 +217,7 @@
           <a:p>
             <a:fld id="{5E29FD6E-4EEA-407E-8337-47EDBBA2C55A}" type="datetimeFigureOut">
               <a:rPr lang="en-US" smtClean="0"/>
-              <a:t>9/12/2021</a:t>
+              <a:t>9/20/2021</a:t>
             </a:fld>
             <a:endParaRPr lang="en-US"/>
           </a:p>
@@ -1437,6 +1441,110 @@
           <a:lstStyle/>
           <a:p>
             <a:r>
+              <a:rPr lang="en-US" sz="1800" dirty="0"/>
+              <a:t>SVM classification is based on the idea of decision hyperplanes that determine decision boundaries in input space or high dimensional feature space. The linear separator is commonly constructed with maximum distance from the hyperplane to the closest negative and positive samples. </a:t>
+            </a:r>
+          </a:p>
+          <a:p>
+            <a:endParaRPr lang="en-US" sz="1800" dirty="0"/>
+          </a:p>
+          <a:p>
+            <a:r>
+              <a:rPr lang="en-US" sz="1800" b="1" i="0" dirty="0">
+                <a:solidFill>
+                  <a:srgbClr val="000000"/>
+                </a:solidFill>
+                <a:effectLst/>
+                <a:latin typeface="Raleway" panose="020B0604020202020204" pitchFamily="2" charset="0"/>
+              </a:rPr>
+              <a:t>the objective is to find a hyperplane that maximizes the separation of the data points to their potential classes in an -dimensional space.</a:t>
+            </a:r>
+            <a:r>
+              <a:rPr lang="en-US" sz="1800" b="0" i="0" dirty="0">
+                <a:solidFill>
+                  <a:srgbClr val="000000"/>
+                </a:solidFill>
+                <a:effectLst/>
+                <a:latin typeface="Raleway" panose="020B0604020202020204" pitchFamily="2" charset="0"/>
+              </a:rPr>
+              <a:t> The data points with the minimum distance to the hyperplane (closest points) are called </a:t>
+            </a:r>
+            <a:r>
+              <a:rPr lang="en-US" sz="1800" b="0" i="1" dirty="0">
+                <a:solidFill>
+                  <a:srgbClr val="000000"/>
+                </a:solidFill>
+                <a:effectLst/>
+                <a:latin typeface="Raleway" panose="020B0604020202020204" pitchFamily="2" charset="0"/>
+              </a:rPr>
+              <a:t>Support Vectors</a:t>
+            </a:r>
+            <a:r>
+              <a:rPr lang="en-US" sz="1800" b="0" i="0" dirty="0">
+                <a:solidFill>
+                  <a:srgbClr val="000000"/>
+                </a:solidFill>
+                <a:effectLst/>
+                <a:latin typeface="Raleway" panose="020B0604020202020204" pitchFamily="2" charset="0"/>
+              </a:rPr>
+              <a:t>.</a:t>
+            </a:r>
+          </a:p>
+          <a:p>
+            <a:pPr marL="0" marR="0" lvl="0" indent="0" algn="l" defTabSz="914400" rtl="0" eaLnBrk="1" fontAlgn="auto" latinLnBrk="0" hangingPunct="1">
+              <a:lnSpc>
+                <a:spcPct val="100000"/>
+              </a:lnSpc>
+              <a:spcBef>
+                <a:spcPts val="0"/>
+              </a:spcBef>
+              <a:spcAft>
+                <a:spcPts val="0"/>
+              </a:spcAft>
+              <a:buClrTx/>
+              <a:buSzTx/>
+              <a:buFontTx/>
+              <a:buNone/>
+              <a:tabLst/>
+              <a:defRPr/>
+            </a:pPr>
+            <a:r>
+              <a:rPr lang="en-US" sz="1800" dirty="0">
+                <a:solidFill>
+                  <a:srgbClr val="000000"/>
+                </a:solidFill>
+                <a:effectLst/>
+                <a:latin typeface="Times New Roman" panose="02020603050405020304" pitchFamily="18" charset="0"/>
+                <a:ea typeface="Times New Roman" panose="02020603050405020304" pitchFamily="18" charset="0"/>
+              </a:rPr>
+              <a:t>The support vectors of the hyperplane are the two dotted lines that run parallel to the hyperplane and cross the nearest points of each of the classes. The distance between the supporting vectors and the hyperplane is now referred to as a margin. And the SVM algorithm's goal is to maximize this margin. The hyperplane with the greatest margin is the best hyperplane.</a:t>
+            </a:r>
+          </a:p>
+          <a:p>
+            <a:endParaRPr lang="en-US" sz="1800" dirty="0"/>
+          </a:p>
+          <a:p>
+            <a:endParaRPr lang="en-US" sz="1800" dirty="0">
+              <a:solidFill>
+                <a:srgbClr val="000000"/>
+              </a:solidFill>
+              <a:effectLst/>
+              <a:latin typeface="Times New Roman" panose="02020603050405020304" pitchFamily="18" charset="0"/>
+              <a:ea typeface="Times New Roman" panose="02020603050405020304" pitchFamily="18" charset="0"/>
+            </a:endParaRPr>
+          </a:p>
+          <a:p>
+            <a:endParaRPr lang="en-US" sz="1800" dirty="0">
+              <a:solidFill>
+                <a:srgbClr val="000000"/>
+              </a:solidFill>
+              <a:effectLst/>
+              <a:latin typeface="Times New Roman" panose="02020603050405020304" pitchFamily="18" charset="0"/>
+              <a:ea typeface="Times New Roman" panose="02020603050405020304" pitchFamily="18" charset="0"/>
+            </a:endParaRPr>
+          </a:p>
+          <a:p>
+            <a:r>
               <a:rPr lang="en-US" sz="1800" dirty="0">
                 <a:solidFill>
                   <a:srgbClr val="000000"/>
@@ -1467,8 +1575,71 @@
                 <a:latin typeface="Times New Roman" panose="02020603050405020304" pitchFamily="18" charset="0"/>
                 <a:ea typeface="Times New Roman" panose="02020603050405020304" pitchFamily="18" charset="0"/>
               </a:rPr>
-              <a:t>Non-linear SVM is used to classify data that cannot be classified using a straight line. We do this by employing a kernel approach, which places data points in a higher dimension from which they may be separated using planes or other mathematical functions. </a:t>
-            </a:r>
+              <a:t>To begin, a set of points from each class is plotted and visualized as shown in Figure 3.3. We can efficiently separate these two classes in a 2-d space by simply applying a straight line. However, various lines can be used to classify these classes. </a:t>
+            </a:r>
+          </a:p>
+          <a:p>
+            <a:pPr marL="0" marR="0" lvl="0" indent="0" algn="l" defTabSz="914400" rtl="0" eaLnBrk="1" fontAlgn="auto" latinLnBrk="0" hangingPunct="1">
+              <a:lnSpc>
+                <a:spcPct val="100000"/>
+              </a:lnSpc>
+              <a:spcBef>
+                <a:spcPts val="0"/>
+              </a:spcBef>
+              <a:spcAft>
+                <a:spcPts val="0"/>
+              </a:spcAft>
+              <a:buClrTx/>
+              <a:buSzTx/>
+              <a:buFontTx/>
+              <a:buNone/>
+              <a:tabLst/>
+              <a:defRPr/>
+            </a:pPr>
+            <a:r>
+              <a:rPr lang="en-US" sz="1800" dirty="0">
+                <a:solidFill>
+                  <a:srgbClr val="000000"/>
+                </a:solidFill>
+                <a:effectLst/>
+                <a:latin typeface="Times New Roman" panose="02020603050405020304" pitchFamily="18" charset="0"/>
+                <a:ea typeface="Times New Roman" panose="02020603050405020304" pitchFamily="18" charset="0"/>
+              </a:rPr>
+              <a:t>Essentially, choose the hyper-plane that best separates the two groups. This is accomplished by increasing the distance between the closest data point and the hyper-plane. The better the hyperplane and the better the categorization results, the bigger the distance. The </a:t>
+            </a:r>
+            <a:r>
+              <a:rPr lang="en-US" sz="1800" b="1" dirty="0">
+                <a:solidFill>
+                  <a:srgbClr val="000000"/>
+                </a:solidFill>
+                <a:effectLst/>
+                <a:latin typeface="Times New Roman" panose="02020603050405020304" pitchFamily="18" charset="0"/>
+                <a:ea typeface="Times New Roman" panose="02020603050405020304" pitchFamily="18" charset="0"/>
+              </a:rPr>
+              <a:t>hyperplane chosen has the greatest distance from the nearest point from each of those classes</a:t>
+            </a:r>
+            <a:r>
+              <a:rPr lang="en-US" sz="1800" dirty="0">
+                <a:solidFill>
+                  <a:srgbClr val="000000"/>
+                </a:solidFill>
+                <a:effectLst/>
+                <a:latin typeface="Times New Roman" panose="02020603050405020304" pitchFamily="18" charset="0"/>
+                <a:ea typeface="Times New Roman" panose="02020603050405020304" pitchFamily="18" charset="0"/>
+              </a:rPr>
+              <a:t>, as shown in the diagram in Figure 3.3.</a:t>
+            </a:r>
+          </a:p>
+          <a:p>
+            <a:endParaRPr lang="en-US" sz="1800" dirty="0">
+              <a:solidFill>
+                <a:srgbClr val="000000"/>
+              </a:solidFill>
+              <a:effectLst/>
+              <a:latin typeface="Times New Roman" panose="02020603050405020304" pitchFamily="18" charset="0"/>
+            </a:endParaRPr>
+          </a:p>
+          <a:p>
             <a:endParaRPr lang="en-US" dirty="0"/>
           </a:p>
         </p:txBody>
@@ -1499,7 +1670,7 @@
     </p:spTree>
     <p:extLst>
       <p:ext uri="{BB962C8B-B14F-4D97-AF65-F5344CB8AC3E}">
-        <p14:creationId xmlns:p14="http://schemas.microsoft.com/office/powerpoint/2010/main" val="1852879958"/>
+        <p14:creationId xmlns:p14="http://schemas.microsoft.com/office/powerpoint/2010/main" val="832401076"/>
       </p:ext>
     </p:extLst>
   </p:cSld>
@@ -1553,6 +1724,287 @@
           <a:bodyPr/>
           <a:lstStyle/>
           <a:p>
+            <a:pPr marL="0" marR="0" lvl="0" indent="0" algn="l" defTabSz="914400" rtl="0" eaLnBrk="1" fontAlgn="auto" latinLnBrk="0" hangingPunct="1">
+              <a:lnSpc>
+                <a:spcPct val="100000"/>
+              </a:lnSpc>
+              <a:spcBef>
+                <a:spcPts val="0"/>
+              </a:spcBef>
+              <a:spcAft>
+                <a:spcPts val="0"/>
+              </a:spcAft>
+              <a:buClrTx/>
+              <a:buSzTx/>
+              <a:buFontTx/>
+              <a:buNone/>
+              <a:tabLst/>
+              <a:defRPr/>
+            </a:pPr>
+            <a:r>
+              <a:rPr lang="en-US" sz="1800" dirty="0">
+                <a:solidFill>
+                  <a:srgbClr val="000000"/>
+                </a:solidFill>
+                <a:effectLst/>
+                <a:latin typeface="Times New Roman" panose="02020603050405020304" pitchFamily="18" charset="0"/>
+                <a:ea typeface="Times New Roman" panose="02020603050405020304" pitchFamily="18" charset="0"/>
+              </a:rPr>
+              <a:t>It is simple to create a linear hyper-plane between these two classes in the SVM classifier. However, if the data is not linearly separable, the SVM algorithm employs a technique known as the kernel trick., it turns a not separable problem into a separable problem. Complex data transformations are performed based on the labels or outputs that specify them.</a:t>
+            </a:r>
+          </a:p>
+          <a:p>
+            <a:pPr marL="0" marR="0" lvl="0" indent="0" algn="l" defTabSz="914400" rtl="0" eaLnBrk="1" fontAlgn="auto" latinLnBrk="0" hangingPunct="1">
+              <a:lnSpc>
+                <a:spcPct val="100000"/>
+              </a:lnSpc>
+              <a:spcBef>
+                <a:spcPts val="0"/>
+              </a:spcBef>
+              <a:spcAft>
+                <a:spcPts val="0"/>
+              </a:spcAft>
+              <a:buClrTx/>
+              <a:buSzTx/>
+              <a:buFontTx/>
+              <a:buNone/>
+              <a:tabLst/>
+              <a:defRPr/>
+            </a:pPr>
+            <a:endParaRPr lang="en-US" sz="1800" dirty="0">
+              <a:solidFill>
+                <a:srgbClr val="000000"/>
+              </a:solidFill>
+              <a:effectLst/>
+              <a:latin typeface="Times New Roman" panose="02020603050405020304" pitchFamily="18" charset="0"/>
+              <a:ea typeface="Times New Roman" panose="02020603050405020304" pitchFamily="18" charset="0"/>
+            </a:endParaRPr>
+          </a:p>
+          <a:p>
+            <a:pPr marL="0" marR="0" lvl="0" indent="0" algn="l" defTabSz="914400" rtl="0" eaLnBrk="1" fontAlgn="auto" latinLnBrk="0" hangingPunct="1">
+              <a:lnSpc>
+                <a:spcPct val="100000"/>
+              </a:lnSpc>
+              <a:spcBef>
+                <a:spcPts val="0"/>
+              </a:spcBef>
+              <a:spcAft>
+                <a:spcPts val="0"/>
+              </a:spcAft>
+              <a:buClrTx/>
+              <a:buSzTx/>
+              <a:buFontTx/>
+              <a:buNone/>
+              <a:tabLst/>
+              <a:defRPr/>
+            </a:pPr>
+            <a:r>
+              <a:rPr lang="en-US" sz="2800" dirty="0"/>
+              <a:t>The four commonly used families of kernels are:</a:t>
+            </a:r>
+            <a:endParaRPr lang="en-US" sz="1800" dirty="0">
+              <a:solidFill>
+                <a:srgbClr val="000000"/>
+              </a:solidFill>
+              <a:effectLst/>
+              <a:latin typeface="Times New Roman" panose="02020603050405020304" pitchFamily="18" charset="0"/>
+            </a:endParaRPr>
+          </a:p>
+          <a:p>
+            <a:pPr marL="0" marR="0" lvl="0" indent="0" algn="l" defTabSz="914400" rtl="0" eaLnBrk="1" fontAlgn="auto" latinLnBrk="0" hangingPunct="1">
+              <a:lnSpc>
+                <a:spcPct val="100000"/>
+              </a:lnSpc>
+              <a:spcBef>
+                <a:spcPts val="0"/>
+              </a:spcBef>
+              <a:spcAft>
+                <a:spcPts val="0"/>
+              </a:spcAft>
+              <a:buClrTx/>
+              <a:buSzTx/>
+              <a:buFontTx/>
+              <a:buNone/>
+              <a:tabLst/>
+              <a:defRPr/>
+            </a:pPr>
+            <a:r>
+              <a:rPr lang="en-US" sz="1800" dirty="0">
+                <a:solidFill>
+                  <a:srgbClr val="000000"/>
+                </a:solidFill>
+                <a:effectLst/>
+                <a:latin typeface="Times New Roman" panose="02020603050405020304" pitchFamily="18" charset="0"/>
+                <a:ea typeface="Times New Roman" panose="02020603050405020304" pitchFamily="18" charset="0"/>
+              </a:rPr>
+              <a:t>• Linear kernel </a:t>
+            </a:r>
+          </a:p>
+          <a:p>
+            <a:pPr marL="0" marR="0" lvl="0" indent="0" algn="l" defTabSz="914400" rtl="0" eaLnBrk="1" fontAlgn="auto" latinLnBrk="0" hangingPunct="1">
+              <a:lnSpc>
+                <a:spcPct val="100000"/>
+              </a:lnSpc>
+              <a:spcBef>
+                <a:spcPts val="0"/>
+              </a:spcBef>
+              <a:spcAft>
+                <a:spcPts val="0"/>
+              </a:spcAft>
+              <a:buClrTx/>
+              <a:buSzTx/>
+              <a:buFontTx/>
+              <a:buNone/>
+              <a:tabLst/>
+              <a:defRPr/>
+            </a:pPr>
+            <a:r>
+              <a:rPr lang="en-US" sz="1800" dirty="0">
+                <a:solidFill>
+                  <a:srgbClr val="000000"/>
+                </a:solidFill>
+                <a:effectLst/>
+                <a:latin typeface="Times New Roman" panose="02020603050405020304" pitchFamily="18" charset="0"/>
+                <a:ea typeface="Times New Roman" panose="02020603050405020304" pitchFamily="18" charset="0"/>
+              </a:rPr>
+              <a:t>• Polynomial kernel with degree d</a:t>
+            </a:r>
+          </a:p>
+          <a:p>
+            <a:pPr marL="0" marR="0" lvl="0" indent="0" algn="l" defTabSz="914400" rtl="0" eaLnBrk="1" fontAlgn="auto" latinLnBrk="0" hangingPunct="1">
+              <a:lnSpc>
+                <a:spcPct val="100000"/>
+              </a:lnSpc>
+              <a:spcBef>
+                <a:spcPts val="0"/>
+              </a:spcBef>
+              <a:spcAft>
+                <a:spcPts val="0"/>
+              </a:spcAft>
+              <a:buClrTx/>
+              <a:buSzTx/>
+              <a:buFontTx/>
+              <a:buNone/>
+              <a:tabLst/>
+              <a:defRPr/>
+            </a:pPr>
+            <a:r>
+              <a:rPr lang="en-US" sz="1800" dirty="0">
+                <a:solidFill>
+                  <a:srgbClr val="000000"/>
+                </a:solidFill>
+                <a:effectLst/>
+                <a:latin typeface="Times New Roman" panose="02020603050405020304" pitchFamily="18" charset="0"/>
+                <a:ea typeface="Times New Roman" panose="02020603050405020304" pitchFamily="18" charset="0"/>
+              </a:rPr>
+              <a:t>• Radial basis function (RBF) kernel (</a:t>
+            </a:r>
+            <a:r>
+              <a:rPr lang="el-GR" sz="1800" dirty="0">
+                <a:solidFill>
+                  <a:srgbClr val="000000"/>
+                </a:solidFill>
+                <a:effectLst/>
+                <a:latin typeface="Times New Roman" panose="02020603050405020304" pitchFamily="18" charset="0"/>
+                <a:ea typeface="Times New Roman" panose="02020603050405020304" pitchFamily="18" charset="0"/>
+              </a:rPr>
+              <a:t>σ </a:t>
+            </a:r>
+            <a:r>
+              <a:rPr lang="en-US" sz="1800" dirty="0">
+                <a:solidFill>
+                  <a:srgbClr val="000000"/>
+                </a:solidFill>
+                <a:effectLst/>
+                <a:latin typeface="Times New Roman" panose="02020603050405020304" pitchFamily="18" charset="0"/>
+                <a:ea typeface="Times New Roman" panose="02020603050405020304" pitchFamily="18" charset="0"/>
+              </a:rPr>
+              <a:t>is a positive</a:t>
+            </a:r>
+          </a:p>
+          <a:p>
+            <a:pPr marL="0" marR="0" lvl="0" indent="0" algn="l" defTabSz="914400" rtl="0" eaLnBrk="1" fontAlgn="auto" latinLnBrk="0" hangingPunct="1">
+              <a:lnSpc>
+                <a:spcPct val="100000"/>
+              </a:lnSpc>
+              <a:spcBef>
+                <a:spcPts val="0"/>
+              </a:spcBef>
+              <a:spcAft>
+                <a:spcPts val="0"/>
+              </a:spcAft>
+              <a:buClrTx/>
+              <a:buSzTx/>
+              <a:buFontTx/>
+              <a:buNone/>
+              <a:tabLst/>
+              <a:defRPr/>
+            </a:pPr>
+            <a:r>
+              <a:rPr lang="en-US" sz="1800" dirty="0">
+                <a:solidFill>
+                  <a:srgbClr val="000000"/>
+                </a:solidFill>
+                <a:effectLst/>
+                <a:latin typeface="Times New Roman" panose="02020603050405020304" pitchFamily="18" charset="0"/>
+                <a:ea typeface="Times New Roman" panose="02020603050405020304" pitchFamily="18" charset="0"/>
+              </a:rPr>
+              <a:t>parameter for controlling the radius)</a:t>
+            </a:r>
+          </a:p>
+          <a:p>
+            <a:pPr marL="0" marR="0" lvl="0" indent="0" algn="l" defTabSz="914400" rtl="0" eaLnBrk="1" fontAlgn="auto" latinLnBrk="0" hangingPunct="1">
+              <a:lnSpc>
+                <a:spcPct val="100000"/>
+              </a:lnSpc>
+              <a:spcBef>
+                <a:spcPts val="0"/>
+              </a:spcBef>
+              <a:spcAft>
+                <a:spcPts val="0"/>
+              </a:spcAft>
+              <a:buClrTx/>
+              <a:buSzTx/>
+              <a:buFontTx/>
+              <a:buNone/>
+              <a:tabLst/>
+              <a:defRPr/>
+            </a:pPr>
+            <a:r>
+              <a:rPr lang="en-US" sz="1800" dirty="0">
+                <a:solidFill>
+                  <a:srgbClr val="000000"/>
+                </a:solidFill>
+                <a:effectLst/>
+                <a:latin typeface="Times New Roman" panose="02020603050405020304" pitchFamily="18" charset="0"/>
+                <a:ea typeface="Times New Roman" panose="02020603050405020304" pitchFamily="18" charset="0"/>
+              </a:rPr>
+              <a:t>• Sigmoid kernel (</a:t>
+            </a:r>
+            <a:r>
+              <a:rPr lang="el-GR" sz="1800" dirty="0">
+                <a:solidFill>
+                  <a:srgbClr val="000000"/>
+                </a:solidFill>
+                <a:effectLst/>
+                <a:latin typeface="Times New Roman" panose="02020603050405020304" pitchFamily="18" charset="0"/>
+                <a:ea typeface="Times New Roman" panose="02020603050405020304" pitchFamily="18" charset="0"/>
+              </a:rPr>
+              <a:t>δ </a:t>
+            </a:r>
+            <a:r>
+              <a:rPr lang="en-US" sz="1800" dirty="0">
+                <a:solidFill>
+                  <a:srgbClr val="000000"/>
+                </a:solidFill>
+                <a:effectLst/>
+                <a:latin typeface="Times New Roman" panose="02020603050405020304" pitchFamily="18" charset="0"/>
+                <a:ea typeface="Times New Roman" panose="02020603050405020304" pitchFamily="18" charset="0"/>
+              </a:rPr>
+              <a:t>is a positive parameter)</a:t>
+            </a:r>
+          </a:p>
+          <a:p>
             <a:endParaRPr lang="en-US" dirty="0"/>
           </a:p>
         </p:txBody>
@@ -1583,7 +2035,765 @@
     </p:spTree>
     <p:extLst>
       <p:ext uri="{BB962C8B-B14F-4D97-AF65-F5344CB8AC3E}">
+        <p14:creationId xmlns:p14="http://schemas.microsoft.com/office/powerpoint/2010/main" val="2750747614"/>
+      </p:ext>
+    </p:extLst>
+  </p:cSld>
+  <p:clrMapOvr>
+    <a:masterClrMapping/>
+  </p:clrMapOvr>
+</p:notes>
+</file>
+
+<file path=ppt/notesSlides/notesSlide16.xml><?xml version="1.0" encoding="utf-8"?>
+<p:notes xmlns:a="http://schemas.openxmlformats.org/drawingml/2006/main" xmlns:r="http://schemas.openxmlformats.org/officeDocument/2006/relationships" xmlns:p="http://schemas.openxmlformats.org/presentationml/2006/main">
+  <p:cSld>
+    <p:spTree>
+      <p:nvGrpSpPr>
+        <p:cNvPr id="1" name=""/>
+        <p:cNvGrpSpPr/>
+        <p:nvPr/>
+      </p:nvGrpSpPr>
+      <p:grpSpPr>
+        <a:xfrm>
+          <a:off x="0" y="0"/>
+          <a:ext cx="0" cy="0"/>
+          <a:chOff x="0" y="0"/>
+          <a:chExt cx="0" cy="0"/>
+        </a:xfrm>
+      </p:grpSpPr>
+      <p:sp>
+        <p:nvSpPr>
+          <p:cNvPr id="2" name="Slide Image Placeholder 1"/>
+          <p:cNvSpPr>
+            <a:spLocks noGrp="1" noRot="1" noChangeAspect="1"/>
+          </p:cNvSpPr>
+          <p:nvPr>
+            <p:ph type="sldImg"/>
+          </p:nvPr>
+        </p:nvSpPr>
+        <p:spPr/>
+      </p:sp>
+      <p:sp>
+        <p:nvSpPr>
+          <p:cNvPr id="3" name="Notes Placeholder 2"/>
+          <p:cNvSpPr>
+            <a:spLocks noGrp="1"/>
+          </p:cNvSpPr>
+          <p:nvPr>
+            <p:ph type="body" idx="1"/>
+          </p:nvPr>
+        </p:nvSpPr>
+        <p:spPr/>
+        <p:txBody>
+          <a:bodyPr/>
+          <a:lstStyle/>
+          <a:p>
+            <a:endParaRPr lang="en-US" dirty="0"/>
+          </a:p>
+        </p:txBody>
+      </p:sp>
+      <p:sp>
+        <p:nvSpPr>
+          <p:cNvPr id="4" name="Slide Number Placeholder 3"/>
+          <p:cNvSpPr>
+            <a:spLocks noGrp="1"/>
+          </p:cNvSpPr>
+          <p:nvPr>
+            <p:ph type="sldNum" sz="quarter" idx="5"/>
+          </p:nvPr>
+        </p:nvSpPr>
+        <p:spPr/>
+        <p:txBody>
+          <a:bodyPr/>
+          <a:lstStyle/>
+          <a:p>
+            <a:fld id="{933308B1-1F68-4EE6-9448-4DD9913136AE}" type="slidenum">
+              <a:rPr lang="en-US" smtClean="0"/>
+              <a:t>18</a:t>
+            </a:fld>
+            <a:endParaRPr lang="en-US"/>
+          </a:p>
+        </p:txBody>
+      </p:sp>
+    </p:spTree>
+    <p:extLst>
+      <p:ext uri="{BB962C8B-B14F-4D97-AF65-F5344CB8AC3E}">
+        <p14:creationId xmlns:p14="http://schemas.microsoft.com/office/powerpoint/2010/main" val="1852879958"/>
+      </p:ext>
+    </p:extLst>
+  </p:cSld>
+  <p:clrMapOvr>
+    <a:masterClrMapping/>
+  </p:clrMapOvr>
+</p:notes>
+</file>
+
+<file path=ppt/notesSlides/notesSlide17.xml><?xml version="1.0" encoding="utf-8"?>
+<p:notes xmlns:a="http://schemas.openxmlformats.org/drawingml/2006/main" xmlns:r="http://schemas.openxmlformats.org/officeDocument/2006/relationships" xmlns:p="http://schemas.openxmlformats.org/presentationml/2006/main">
+  <p:cSld>
+    <p:spTree>
+      <p:nvGrpSpPr>
+        <p:cNvPr id="1" name=""/>
+        <p:cNvGrpSpPr/>
+        <p:nvPr/>
+      </p:nvGrpSpPr>
+      <p:grpSpPr>
+        <a:xfrm>
+          <a:off x="0" y="0"/>
+          <a:ext cx="0" cy="0"/>
+          <a:chOff x="0" y="0"/>
+          <a:chExt cx="0" cy="0"/>
+        </a:xfrm>
+      </p:grpSpPr>
+      <p:sp>
+        <p:nvSpPr>
+          <p:cNvPr id="2" name="Slide Image Placeholder 1"/>
+          <p:cNvSpPr>
+            <a:spLocks noGrp="1" noRot="1" noChangeAspect="1"/>
+          </p:cNvSpPr>
+          <p:nvPr>
+            <p:ph type="sldImg"/>
+          </p:nvPr>
+        </p:nvSpPr>
+        <p:spPr/>
+      </p:sp>
+      <p:sp>
+        <p:nvSpPr>
+          <p:cNvPr id="3" name="Notes Placeholder 2"/>
+          <p:cNvSpPr>
+            <a:spLocks noGrp="1"/>
+          </p:cNvSpPr>
+          <p:nvPr>
+            <p:ph type="body" idx="1"/>
+          </p:nvPr>
+        </p:nvSpPr>
+        <p:spPr/>
+        <p:txBody>
+          <a:bodyPr/>
+          <a:lstStyle/>
+          <a:p>
+            <a:pPr marL="0" marR="0" indent="0" algn="just">
+              <a:lnSpc>
+                <a:spcPct val="150000"/>
+              </a:lnSpc>
+              <a:spcBef>
+                <a:spcPts val="0"/>
+              </a:spcBef>
+              <a:spcAft>
+                <a:spcPts val="1000"/>
+              </a:spcAft>
+            </a:pPr>
+            <a:r>
+              <a:rPr lang="en-GB" sz="1800" dirty="0">
+                <a:solidFill>
+                  <a:srgbClr val="000000"/>
+                </a:solidFill>
+                <a:effectLst/>
+                <a:latin typeface="Times New Roman" panose="02020603050405020304" pitchFamily="18" charset="0"/>
+                <a:ea typeface="Times New Roman" panose="02020603050405020304" pitchFamily="18" charset="0"/>
+              </a:rPr>
+              <a:t>Previously resolved bug reports are used to train the data model. Labels extracted from the bug Title and Description through data pre-processing and are used to train the data model.</a:t>
+            </a:r>
+          </a:p>
+          <a:p>
+            <a:pPr marL="0" marR="0" indent="0" algn="just">
+              <a:lnSpc>
+                <a:spcPct val="150000"/>
+              </a:lnSpc>
+              <a:spcBef>
+                <a:spcPts val="0"/>
+              </a:spcBef>
+              <a:spcAft>
+                <a:spcPts val="1000"/>
+              </a:spcAft>
+            </a:pPr>
+            <a:endParaRPr lang="en-GB" sz="1800" dirty="0">
+              <a:solidFill>
+                <a:srgbClr val="000000"/>
+              </a:solidFill>
+              <a:effectLst/>
+              <a:latin typeface="Times New Roman" panose="02020603050405020304" pitchFamily="18" charset="0"/>
+              <a:ea typeface="Times New Roman" panose="02020603050405020304" pitchFamily="18" charset="0"/>
+            </a:endParaRPr>
+          </a:p>
+          <a:p>
+            <a:pPr marL="0" marR="0" indent="0" algn="just">
+              <a:lnSpc>
+                <a:spcPct val="150000"/>
+              </a:lnSpc>
+              <a:spcBef>
+                <a:spcPts val="0"/>
+              </a:spcBef>
+              <a:spcAft>
+                <a:spcPts val="1000"/>
+              </a:spcAft>
+            </a:pPr>
+            <a:r>
+              <a:rPr lang="en-GB" sz="1800" dirty="0">
+                <a:solidFill>
+                  <a:srgbClr val="000000"/>
+                </a:solidFill>
+                <a:effectLst/>
+                <a:latin typeface="Times New Roman" panose="02020603050405020304" pitchFamily="18" charset="0"/>
+                <a:ea typeface="Times New Roman" panose="02020603050405020304" pitchFamily="18" charset="0"/>
+              </a:rPr>
+              <a:t>One of the system users are the bug reporter who will manually input the bug report attributes such as Title, Description, Priority, Severity, Reported By, Reported Date. </a:t>
+            </a:r>
+            <a:r>
+              <a:rPr lang="en-US" sz="1800" dirty="0">
+                <a:solidFill>
+                  <a:srgbClr val="000000"/>
+                </a:solidFill>
+                <a:effectLst/>
+                <a:latin typeface="Times New Roman" panose="02020603050405020304" pitchFamily="18" charset="0"/>
+                <a:ea typeface="Times New Roman" panose="02020603050405020304" pitchFamily="18" charset="0"/>
+              </a:rPr>
+              <a:t>With the algorithm therein, when a bug reporter enters the bug details, the application will be able to retrieve the recommended team to resolve the bug.</a:t>
+            </a:r>
+          </a:p>
+        </p:txBody>
+      </p:sp>
+      <p:sp>
+        <p:nvSpPr>
+          <p:cNvPr id="4" name="Slide Number Placeholder 3"/>
+          <p:cNvSpPr>
+            <a:spLocks noGrp="1"/>
+          </p:cNvSpPr>
+          <p:nvPr>
+            <p:ph type="sldNum" sz="quarter" idx="5"/>
+          </p:nvPr>
+        </p:nvSpPr>
+        <p:spPr/>
+        <p:txBody>
+          <a:bodyPr/>
+          <a:lstStyle/>
+          <a:p>
+            <a:fld id="{933308B1-1F68-4EE6-9448-4DD9913136AE}" type="slidenum">
+              <a:rPr lang="en-US" smtClean="0"/>
+              <a:t>19</a:t>
+            </a:fld>
+            <a:endParaRPr lang="en-US"/>
+          </a:p>
+        </p:txBody>
+      </p:sp>
+    </p:spTree>
+    <p:extLst>
+      <p:ext uri="{BB962C8B-B14F-4D97-AF65-F5344CB8AC3E}">
         <p14:creationId xmlns:p14="http://schemas.microsoft.com/office/powerpoint/2010/main" val="3914078094"/>
+      </p:ext>
+    </p:extLst>
+  </p:cSld>
+  <p:clrMapOvr>
+    <a:masterClrMapping/>
+  </p:clrMapOvr>
+</p:notes>
+</file>
+
+<file path=ppt/notesSlides/notesSlide18.xml><?xml version="1.0" encoding="utf-8"?>
+<p:notes xmlns:a="http://schemas.openxmlformats.org/drawingml/2006/main" xmlns:r="http://schemas.openxmlformats.org/officeDocument/2006/relationships" xmlns:p="http://schemas.openxmlformats.org/presentationml/2006/main">
+  <p:cSld>
+    <p:spTree>
+      <p:nvGrpSpPr>
+        <p:cNvPr id="1" name=""/>
+        <p:cNvGrpSpPr/>
+        <p:nvPr/>
+      </p:nvGrpSpPr>
+      <p:grpSpPr>
+        <a:xfrm>
+          <a:off x="0" y="0"/>
+          <a:ext cx="0" cy="0"/>
+          <a:chOff x="0" y="0"/>
+          <a:chExt cx="0" cy="0"/>
+        </a:xfrm>
+      </p:grpSpPr>
+      <p:sp>
+        <p:nvSpPr>
+          <p:cNvPr id="2" name="Slide Image Placeholder 1"/>
+          <p:cNvSpPr>
+            <a:spLocks noGrp="1" noRot="1" noChangeAspect="1"/>
+          </p:cNvSpPr>
+          <p:nvPr>
+            <p:ph type="sldImg"/>
+          </p:nvPr>
+        </p:nvSpPr>
+        <p:spPr/>
+      </p:sp>
+      <p:sp>
+        <p:nvSpPr>
+          <p:cNvPr id="3" name="Notes Placeholder 2"/>
+          <p:cNvSpPr>
+            <a:spLocks noGrp="1"/>
+          </p:cNvSpPr>
+          <p:nvPr>
+            <p:ph type="body" idx="1"/>
+          </p:nvPr>
+        </p:nvSpPr>
+        <p:spPr/>
+        <p:txBody>
+          <a:bodyPr/>
+          <a:lstStyle/>
+          <a:p>
+            <a:pPr marL="0" marR="0" indent="457200" algn="just">
+              <a:lnSpc>
+                <a:spcPct val="150000"/>
+              </a:lnSpc>
+              <a:spcBef>
+                <a:spcPts val="0"/>
+              </a:spcBef>
+              <a:spcAft>
+                <a:spcPts val="1000"/>
+              </a:spcAft>
+            </a:pPr>
+            <a:r>
+              <a:rPr lang="en-US" sz="1800" dirty="0">
+                <a:solidFill>
+                  <a:srgbClr val="000000"/>
+                </a:solidFill>
+                <a:effectLst/>
+                <a:latin typeface="Times New Roman" panose="02020603050405020304" pitchFamily="18" charset="0"/>
+                <a:ea typeface="Times New Roman" panose="02020603050405020304" pitchFamily="18" charset="0"/>
+              </a:rPr>
+              <a:t>Bug report summaries are unstructured data that must be pre-processed before being converted to structured data. As a result, the proponent will use the usual text pre-processing method to convert the text data into a meaningful representation:</a:t>
+            </a:r>
+          </a:p>
+          <a:p>
+            <a:pPr marL="342900" marR="0" lvl="0" indent="-342900" algn="just">
+              <a:lnSpc>
+                <a:spcPct val="150000"/>
+              </a:lnSpc>
+              <a:spcBef>
+                <a:spcPts val="0"/>
+              </a:spcBef>
+              <a:spcAft>
+                <a:spcPts val="0"/>
+              </a:spcAft>
+              <a:buFont typeface="Symbol" panose="05050102010706020507" pitchFamily="18" charset="2"/>
+              <a:buChar char=""/>
+            </a:pPr>
+            <a:r>
+              <a:rPr lang="en-US" sz="1800" dirty="0">
+                <a:solidFill>
+                  <a:srgbClr val="000000"/>
+                </a:solidFill>
+                <a:effectLst/>
+                <a:latin typeface="Times New Roman" panose="02020603050405020304" pitchFamily="18" charset="0"/>
+                <a:ea typeface="Times New Roman" panose="02020603050405020304" pitchFamily="18" charset="0"/>
+              </a:rPr>
+              <a:t>Concatenation of Title and Description attributes</a:t>
+            </a:r>
+          </a:p>
+          <a:p>
+            <a:pPr marL="342900" marR="0" lvl="0" indent="-342900" algn="just">
+              <a:lnSpc>
+                <a:spcPct val="150000"/>
+              </a:lnSpc>
+              <a:spcBef>
+                <a:spcPts val="0"/>
+              </a:spcBef>
+              <a:spcAft>
+                <a:spcPts val="0"/>
+              </a:spcAft>
+              <a:buFont typeface="Symbol" panose="05050102010706020507" pitchFamily="18" charset="2"/>
+              <a:buChar char=""/>
+            </a:pPr>
+            <a:r>
+              <a:rPr lang="en-US" sz="1800" dirty="0">
+                <a:solidFill>
+                  <a:srgbClr val="000000"/>
+                </a:solidFill>
+                <a:effectLst/>
+                <a:latin typeface="Times New Roman" panose="02020603050405020304" pitchFamily="18" charset="0"/>
+                <a:ea typeface="Times New Roman" panose="02020603050405020304" pitchFamily="18" charset="0"/>
+              </a:rPr>
+              <a:t>Tokenization - split the summary of each bug report into tokens (terms)</a:t>
+            </a:r>
+          </a:p>
+          <a:p>
+            <a:pPr marL="342900" marR="0" lvl="0" indent="-342900" algn="just">
+              <a:lnSpc>
+                <a:spcPct val="150000"/>
+              </a:lnSpc>
+              <a:spcBef>
+                <a:spcPts val="0"/>
+              </a:spcBef>
+              <a:spcAft>
+                <a:spcPts val="0"/>
+              </a:spcAft>
+              <a:buFont typeface="Symbol" panose="05050102010706020507" pitchFamily="18" charset="2"/>
+              <a:buChar char=""/>
+            </a:pPr>
+            <a:r>
+              <a:rPr lang="en-US" sz="1800" dirty="0">
+                <a:solidFill>
+                  <a:srgbClr val="000000"/>
+                </a:solidFill>
+                <a:effectLst/>
+                <a:latin typeface="Times New Roman" panose="02020603050405020304" pitchFamily="18" charset="0"/>
+                <a:ea typeface="Times New Roman" panose="02020603050405020304" pitchFamily="18" charset="0"/>
+              </a:rPr>
+              <a:t>Lemmatization - combining a word's several inflected forms into a single item for analysis</a:t>
+            </a:r>
+          </a:p>
+          <a:p>
+            <a:pPr marL="342900" marR="0" lvl="0" indent="-342900" algn="just">
+              <a:lnSpc>
+                <a:spcPct val="150000"/>
+              </a:lnSpc>
+              <a:spcBef>
+                <a:spcPts val="0"/>
+              </a:spcBef>
+              <a:spcAft>
+                <a:spcPts val="1000"/>
+              </a:spcAft>
+              <a:buFont typeface="Symbol" panose="05050102010706020507" pitchFamily="18" charset="2"/>
+              <a:buChar char=""/>
+            </a:pPr>
+            <a:r>
+              <a:rPr lang="en-US" sz="1800" dirty="0">
+                <a:solidFill>
+                  <a:srgbClr val="000000"/>
+                </a:solidFill>
+                <a:effectLst/>
+                <a:latin typeface="Times New Roman" panose="02020603050405020304" pitchFamily="18" charset="0"/>
+                <a:ea typeface="Times New Roman" panose="02020603050405020304" pitchFamily="18" charset="0"/>
+              </a:rPr>
+              <a:t>Removal of Stop Words</a:t>
+            </a:r>
+          </a:p>
+          <a:p>
+            <a:pPr marL="342900" marR="0" lvl="0" indent="-342900" algn="just">
+              <a:lnSpc>
+                <a:spcPct val="150000"/>
+              </a:lnSpc>
+              <a:spcBef>
+                <a:spcPts val="0"/>
+              </a:spcBef>
+              <a:spcAft>
+                <a:spcPts val="1000"/>
+              </a:spcAft>
+              <a:buFont typeface="Symbol" panose="05050102010706020507" pitchFamily="18" charset="2"/>
+              <a:buChar char=""/>
+            </a:pPr>
+            <a:endParaRPr lang="en-US" sz="1800" dirty="0">
+              <a:solidFill>
+                <a:srgbClr val="000000"/>
+              </a:solidFill>
+              <a:effectLst/>
+              <a:latin typeface="Times New Roman" panose="02020603050405020304" pitchFamily="18" charset="0"/>
+              <a:ea typeface="Times New Roman" panose="02020603050405020304" pitchFamily="18" charset="0"/>
+            </a:endParaRPr>
+          </a:p>
+          <a:p>
+            <a:pPr marL="0" marR="0" lvl="0" indent="0" algn="just" defTabSz="914400" rtl="0" eaLnBrk="1" fontAlgn="auto" latinLnBrk="0" hangingPunct="1">
+              <a:lnSpc>
+                <a:spcPct val="150000"/>
+              </a:lnSpc>
+              <a:spcBef>
+                <a:spcPts val="0"/>
+              </a:spcBef>
+              <a:spcAft>
+                <a:spcPts val="1000"/>
+              </a:spcAft>
+              <a:buClrTx/>
+              <a:buSzTx/>
+              <a:buFont typeface="Symbol" panose="05050102010706020507" pitchFamily="18" charset="2"/>
+              <a:buNone/>
+              <a:tabLst/>
+              <a:defRPr/>
+            </a:pPr>
+            <a:endParaRPr lang="en-US" sz="1800" dirty="0">
+              <a:solidFill>
+                <a:srgbClr val="000000"/>
+              </a:solidFill>
+              <a:effectLst/>
+              <a:latin typeface="Times New Roman" panose="02020603050405020304" pitchFamily="18" charset="0"/>
+              <a:ea typeface="Times New Roman" panose="02020603050405020304" pitchFamily="18" charset="0"/>
+            </a:endParaRPr>
+          </a:p>
+          <a:p>
+            <a:pPr marL="0" marR="0" lvl="0" indent="0" algn="just" defTabSz="914400" rtl="0" eaLnBrk="1" fontAlgn="auto" latinLnBrk="0" hangingPunct="1">
+              <a:lnSpc>
+                <a:spcPct val="150000"/>
+              </a:lnSpc>
+              <a:spcBef>
+                <a:spcPts val="0"/>
+              </a:spcBef>
+              <a:spcAft>
+                <a:spcPts val="1000"/>
+              </a:spcAft>
+              <a:buClrTx/>
+              <a:buSzTx/>
+              <a:buFont typeface="Symbol" panose="05050102010706020507" pitchFamily="18" charset="2"/>
+              <a:buNone/>
+              <a:tabLst/>
+              <a:defRPr/>
+            </a:pPr>
+            <a:r>
+              <a:rPr lang="en-US" sz="1800" dirty="0">
+                <a:solidFill>
+                  <a:srgbClr val="000000"/>
+                </a:solidFill>
+                <a:effectLst/>
+                <a:latin typeface="Times New Roman" panose="02020603050405020304" pitchFamily="18" charset="0"/>
+                <a:ea typeface="Times New Roman" panose="02020603050405020304" pitchFamily="18" charset="0"/>
+              </a:rPr>
+              <a:t>The next step is Vector space representation where each bug report is represented as a vector and each word in the bug report represents a label. We use the Term Frequency - Inverse Document Frequency (TF-IDF) of the word to get the value of each word feature.</a:t>
+            </a:r>
+          </a:p>
+          <a:p>
+            <a:pPr marL="0" marR="0" lvl="0" indent="0" algn="just" defTabSz="914400" rtl="0" eaLnBrk="1" fontAlgn="auto" latinLnBrk="0" hangingPunct="1">
+              <a:lnSpc>
+                <a:spcPct val="150000"/>
+              </a:lnSpc>
+              <a:spcBef>
+                <a:spcPts val="0"/>
+              </a:spcBef>
+              <a:spcAft>
+                <a:spcPts val="1000"/>
+              </a:spcAft>
+              <a:buClrTx/>
+              <a:buSzTx/>
+              <a:buFont typeface="Symbol" panose="05050102010706020507" pitchFamily="18" charset="2"/>
+              <a:buNone/>
+              <a:tabLst/>
+              <a:defRPr/>
+            </a:pPr>
+            <a:endParaRPr lang="en-US" sz="1800" dirty="0">
+              <a:solidFill>
+                <a:srgbClr val="000000"/>
+              </a:solidFill>
+              <a:effectLst/>
+              <a:latin typeface="Times New Roman" panose="02020603050405020304" pitchFamily="18" charset="0"/>
+              <a:ea typeface="Times New Roman" panose="02020603050405020304" pitchFamily="18" charset="0"/>
+            </a:endParaRPr>
+          </a:p>
+          <a:p>
+            <a:pPr marL="0" marR="0" lvl="0" indent="0" algn="just" defTabSz="914400" rtl="0" eaLnBrk="1" fontAlgn="auto" latinLnBrk="0" hangingPunct="1">
+              <a:lnSpc>
+                <a:spcPct val="150000"/>
+              </a:lnSpc>
+              <a:spcBef>
+                <a:spcPts val="0"/>
+              </a:spcBef>
+              <a:spcAft>
+                <a:spcPts val="1000"/>
+              </a:spcAft>
+              <a:buClrTx/>
+              <a:buSzTx/>
+              <a:buFont typeface="Symbol" panose="05050102010706020507" pitchFamily="18" charset="2"/>
+              <a:buNone/>
+              <a:tabLst/>
+              <a:defRPr/>
+            </a:pPr>
+            <a:r>
+              <a:rPr lang="en-US" sz="1800" dirty="0">
+                <a:solidFill>
+                  <a:srgbClr val="000000"/>
+                </a:solidFill>
+                <a:effectLst/>
+                <a:latin typeface="Times New Roman" panose="02020603050405020304" pitchFamily="18" charset="0"/>
+                <a:ea typeface="Times New Roman" panose="02020603050405020304" pitchFamily="18" charset="0"/>
+              </a:rPr>
+              <a:t>SVM a supervised classification algorithm that finds a decision surface that maximally separates the classes of interest, will be used in this study.</a:t>
+            </a:r>
+          </a:p>
+          <a:p>
+            <a:pPr marL="0" marR="0" lvl="0" indent="0" algn="just" defTabSz="914400" rtl="0" eaLnBrk="1" fontAlgn="auto" latinLnBrk="0" hangingPunct="1">
+              <a:lnSpc>
+                <a:spcPct val="150000"/>
+              </a:lnSpc>
+              <a:spcBef>
+                <a:spcPts val="0"/>
+              </a:spcBef>
+              <a:spcAft>
+                <a:spcPts val="1000"/>
+              </a:spcAft>
+              <a:buClrTx/>
+              <a:buSzTx/>
+              <a:buFont typeface="Symbol" panose="05050102010706020507" pitchFamily="18" charset="2"/>
+              <a:buNone/>
+              <a:tabLst/>
+              <a:defRPr/>
+            </a:pPr>
+            <a:endParaRPr lang="en-US" sz="1800" dirty="0">
+              <a:solidFill>
+                <a:srgbClr val="000000"/>
+              </a:solidFill>
+              <a:effectLst/>
+              <a:latin typeface="Times New Roman" panose="02020603050405020304" pitchFamily="18" charset="0"/>
+              <a:ea typeface="Times New Roman" panose="02020603050405020304" pitchFamily="18" charset="0"/>
+            </a:endParaRPr>
+          </a:p>
+          <a:p>
+            <a:pPr marL="0" marR="0" lvl="0" indent="0" algn="just" defTabSz="914400" rtl="0" eaLnBrk="1" fontAlgn="auto" latinLnBrk="0" hangingPunct="1">
+              <a:lnSpc>
+                <a:spcPct val="150000"/>
+              </a:lnSpc>
+              <a:spcBef>
+                <a:spcPts val="0"/>
+              </a:spcBef>
+              <a:spcAft>
+                <a:spcPts val="1000"/>
+              </a:spcAft>
+              <a:buClrTx/>
+              <a:buSzTx/>
+              <a:buFont typeface="Symbol" panose="05050102010706020507" pitchFamily="18" charset="2"/>
+              <a:buNone/>
+              <a:tabLst/>
+              <a:defRPr/>
+            </a:pPr>
+            <a:endParaRPr lang="en-US" sz="1800" dirty="0">
+              <a:solidFill>
+                <a:srgbClr val="000000"/>
+              </a:solidFill>
+              <a:effectLst/>
+              <a:latin typeface="Times New Roman" panose="02020603050405020304" pitchFamily="18" charset="0"/>
+              <a:ea typeface="Times New Roman" panose="02020603050405020304" pitchFamily="18" charset="0"/>
+            </a:endParaRPr>
+          </a:p>
+          <a:p>
+            <a:pPr marL="342900" marR="0" lvl="0" indent="-342900" algn="just">
+              <a:lnSpc>
+                <a:spcPct val="150000"/>
+              </a:lnSpc>
+              <a:spcBef>
+                <a:spcPts val="0"/>
+              </a:spcBef>
+              <a:spcAft>
+                <a:spcPts val="1000"/>
+              </a:spcAft>
+              <a:buFont typeface="Symbol" panose="05050102010706020507" pitchFamily="18" charset="2"/>
+              <a:buChar char=""/>
+            </a:pPr>
+            <a:endParaRPr lang="en-US" sz="1800" dirty="0">
+              <a:solidFill>
+                <a:srgbClr val="000000"/>
+              </a:solidFill>
+              <a:effectLst/>
+              <a:latin typeface="Times New Roman" panose="02020603050405020304" pitchFamily="18" charset="0"/>
+              <a:ea typeface="Times New Roman" panose="02020603050405020304" pitchFamily="18" charset="0"/>
+            </a:endParaRPr>
+          </a:p>
+          <a:p>
+            <a:endParaRPr lang="en-US" dirty="0"/>
+          </a:p>
+        </p:txBody>
+      </p:sp>
+      <p:sp>
+        <p:nvSpPr>
+          <p:cNvPr id="4" name="Slide Number Placeholder 3"/>
+          <p:cNvSpPr>
+            <a:spLocks noGrp="1"/>
+          </p:cNvSpPr>
+          <p:nvPr>
+            <p:ph type="sldNum" sz="quarter" idx="5"/>
+          </p:nvPr>
+        </p:nvSpPr>
+        <p:spPr/>
+        <p:txBody>
+          <a:bodyPr/>
+          <a:lstStyle/>
+          <a:p>
+            <a:fld id="{933308B1-1F68-4EE6-9448-4DD9913136AE}" type="slidenum">
+              <a:rPr lang="en-US" smtClean="0"/>
+              <a:t>20</a:t>
+            </a:fld>
+            <a:endParaRPr lang="en-US"/>
+          </a:p>
+        </p:txBody>
+      </p:sp>
+    </p:spTree>
+    <p:extLst>
+      <p:ext uri="{BB962C8B-B14F-4D97-AF65-F5344CB8AC3E}">
+        <p14:creationId xmlns:p14="http://schemas.microsoft.com/office/powerpoint/2010/main" val="121334827"/>
+      </p:ext>
+    </p:extLst>
+  </p:cSld>
+  <p:clrMapOvr>
+    <a:masterClrMapping/>
+  </p:clrMapOvr>
+</p:notes>
+</file>
+
+<file path=ppt/notesSlides/notesSlide19.xml><?xml version="1.0" encoding="utf-8"?>
+<p:notes xmlns:a="http://schemas.openxmlformats.org/drawingml/2006/main" xmlns:r="http://schemas.openxmlformats.org/officeDocument/2006/relationships" xmlns:p="http://schemas.openxmlformats.org/presentationml/2006/main">
+  <p:cSld>
+    <p:spTree>
+      <p:nvGrpSpPr>
+        <p:cNvPr id="1" name=""/>
+        <p:cNvGrpSpPr/>
+        <p:nvPr/>
+      </p:nvGrpSpPr>
+      <p:grpSpPr>
+        <a:xfrm>
+          <a:off x="0" y="0"/>
+          <a:ext cx="0" cy="0"/>
+          <a:chOff x="0" y="0"/>
+          <a:chExt cx="0" cy="0"/>
+        </a:xfrm>
+      </p:grpSpPr>
+      <p:sp>
+        <p:nvSpPr>
+          <p:cNvPr id="2" name="Slide Image Placeholder 1"/>
+          <p:cNvSpPr>
+            <a:spLocks noGrp="1" noRot="1" noChangeAspect="1"/>
+          </p:cNvSpPr>
+          <p:nvPr>
+            <p:ph type="sldImg"/>
+          </p:nvPr>
+        </p:nvSpPr>
+        <p:spPr/>
+      </p:sp>
+      <p:sp>
+        <p:nvSpPr>
+          <p:cNvPr id="3" name="Notes Placeholder 2"/>
+          <p:cNvSpPr>
+            <a:spLocks noGrp="1"/>
+          </p:cNvSpPr>
+          <p:nvPr>
+            <p:ph type="body" idx="1"/>
+          </p:nvPr>
+        </p:nvSpPr>
+        <p:spPr/>
+        <p:txBody>
+          <a:bodyPr/>
+          <a:lstStyle/>
+          <a:p>
+            <a:r>
+              <a:rPr lang="en-US" dirty="0"/>
+              <a:t>High Level Data Processing</a:t>
+            </a:r>
+          </a:p>
+        </p:txBody>
+      </p:sp>
+      <p:sp>
+        <p:nvSpPr>
+          <p:cNvPr id="4" name="Slide Number Placeholder 3"/>
+          <p:cNvSpPr>
+            <a:spLocks noGrp="1"/>
+          </p:cNvSpPr>
+          <p:nvPr>
+            <p:ph type="sldNum" sz="quarter" idx="5"/>
+          </p:nvPr>
+        </p:nvSpPr>
+        <p:spPr/>
+        <p:txBody>
+          <a:bodyPr/>
+          <a:lstStyle/>
+          <a:p>
+            <a:fld id="{933308B1-1F68-4EE6-9448-4DD9913136AE}" type="slidenum">
+              <a:rPr lang="en-US" smtClean="0"/>
+              <a:t>21</a:t>
+            </a:fld>
+            <a:endParaRPr lang="en-US"/>
+          </a:p>
+        </p:txBody>
+      </p:sp>
+    </p:spTree>
+    <p:extLst>
+      <p:ext uri="{BB962C8B-B14F-4D97-AF65-F5344CB8AC3E}">
+        <p14:creationId xmlns:p14="http://schemas.microsoft.com/office/powerpoint/2010/main" val="2096733022"/>
       </p:ext>
     </p:extLst>
   </p:cSld>
@@ -2669,7 +3879,28 @@
           <a:bodyPr/>
           <a:lstStyle/>
           <a:p>
-            <a:endParaRPr lang="en-US" dirty="0"/>
+            <a:pPr marL="0" marR="0" indent="457200" algn="just">
+              <a:lnSpc>
+                <a:spcPct val="150000"/>
+              </a:lnSpc>
+              <a:spcBef>
+                <a:spcPts val="0"/>
+              </a:spcBef>
+              <a:spcAft>
+                <a:spcPts val="1000"/>
+              </a:spcAft>
+            </a:pPr>
+            <a:r>
+              <a:rPr lang="en-US" sz="1800" dirty="0">
+                <a:solidFill>
+                  <a:srgbClr val="000000"/>
+                </a:solidFill>
+                <a:effectLst/>
+                <a:latin typeface="Times New Roman" panose="02020603050405020304" pitchFamily="18" charset="0"/>
+                <a:ea typeface="Times New Roman" panose="02020603050405020304" pitchFamily="18" charset="0"/>
+              </a:rPr>
+              <a:t>The researcher formulates the bug assignment problem as a classification task.</a:t>
+            </a:r>
           </a:p>
         </p:txBody>
       </p:sp>
@@ -2956,7 +4187,7 @@
           <a:p>
             <a:fld id="{1160EA64-D806-43AC-9DF2-F8C432F32B4C}" type="datetimeFigureOut">
               <a:rPr lang="en-US" dirty="0"/>
-              <a:t>9/12/2021</a:t>
+              <a:t>9/20/2021</a:t>
             </a:fld>
             <a:endParaRPr lang="en-US" dirty="0"/>
           </a:p>
@@ -3122,7 +4353,7 @@
           <a:p>
             <a:fld id="{E9F9C37B-1D36-470B-8223-D6C91242EC14}" type="datetimeFigureOut">
               <a:rPr lang="en-US" dirty="0"/>
-              <a:t>9/12/2021</a:t>
+              <a:t>9/20/2021</a:t>
             </a:fld>
             <a:endParaRPr lang="en-US" dirty="0"/>
           </a:p>
@@ -3297,7 +4528,7 @@
           <a:p>
             <a:fld id="{67C6F52A-A82B-47A2-A83A-8C4C91F2D59F}" type="datetimeFigureOut">
               <a:rPr lang="en-US" dirty="0"/>
-              <a:t>9/12/2021</a:t>
+              <a:t>9/20/2021</a:t>
             </a:fld>
             <a:endParaRPr lang="en-US" dirty="0"/>
           </a:p>
@@ -3462,7 +4693,7 @@
           <a:p>
             <a:fld id="{F070A7B3-6521-4DCA-87E5-044747A908C1}" type="datetimeFigureOut">
               <a:rPr lang="en-US" dirty="0"/>
-              <a:t>9/12/2021</a:t>
+              <a:t>9/20/2021</a:t>
             </a:fld>
             <a:endParaRPr lang="en-US" dirty="0"/>
           </a:p>
@@ -3726,7 +4957,7 @@
           <a:p>
             <a:fld id="{1160EA64-D806-43AC-9DF2-F8C432F32B4C}" type="datetimeFigureOut">
               <a:rPr lang="en-US" dirty="0"/>
-              <a:t>9/12/2021</a:t>
+              <a:t>9/20/2021</a:t>
             </a:fld>
             <a:endParaRPr lang="en-US" dirty="0"/>
           </a:p>
@@ -3954,7 +5185,7 @@
           <a:p>
             <a:fld id="{AB134690-1557-4C89-A502-4959FE7FAD70}" type="datetimeFigureOut">
               <a:rPr lang="en-US" dirty="0"/>
-              <a:t>9/12/2021</a:t>
+              <a:t>9/20/2021</a:t>
             </a:fld>
             <a:endParaRPr lang="en-US" dirty="0"/>
           </a:p>
@@ -4308,7 +5539,7 @@
           <a:p>
             <a:fld id="{4F7D4976-E339-4826-83B7-FBD03F55ECF8}" type="datetimeFigureOut">
               <a:rPr lang="en-US" dirty="0"/>
-              <a:t>9/12/2021</a:t>
+              <a:t>9/20/2021</a:t>
             </a:fld>
             <a:endParaRPr lang="en-US" dirty="0"/>
           </a:p>
@@ -4444,7 +5675,7 @@
           <a:p>
             <a:fld id="{E1037C31-9E7A-4F99-8774-A0E530DE1A42}" type="datetimeFigureOut">
               <a:rPr lang="en-US" dirty="0"/>
-              <a:t>9/12/2021</a:t>
+              <a:t>9/20/2021</a:t>
             </a:fld>
             <a:endParaRPr lang="en-US" dirty="0"/>
           </a:p>
@@ -4534,7 +5765,7 @@
           <a:p>
             <a:fld id="{C278504F-A551-4DE0-9316-4DCD1D8CC752}" type="datetimeFigureOut">
               <a:rPr lang="en-US" dirty="0"/>
-              <a:t>9/12/2021</a:t>
+              <a:t>9/20/2021</a:t>
             </a:fld>
             <a:endParaRPr lang="en-US" dirty="0"/>
           </a:p>
@@ -4886,7 +6117,7 @@
           <a:p>
             <a:fld id="{D1BE4249-C0D0-4B06-8692-E8BB871AF643}" type="datetimeFigureOut">
               <a:rPr lang="en-US" dirty="0"/>
-              <a:t>9/12/2021</a:t>
+              <a:t>9/20/2021</a:t>
             </a:fld>
             <a:endParaRPr lang="en-US" dirty="0"/>
           </a:p>
@@ -5238,7 +6469,7 @@
           <a:p>
             <a:fld id="{042B0DB6-F5C7-45FB-8CF3-31B45F9C2DAC}" type="datetimeFigureOut">
               <a:rPr lang="en-US" dirty="0"/>
-              <a:t>9/12/2021</a:t>
+              <a:t>9/20/2021</a:t>
             </a:fld>
             <a:endParaRPr lang="en-US" dirty="0"/>
           </a:p>
@@ -5475,7 +6706,7 @@
           <a:p>
             <a:fld id="{1160EA64-D806-43AC-9DF2-F8C432F32B4C}" type="datetimeFigureOut">
               <a:rPr lang="en-US" dirty="0"/>
-              <a:t>9/12/2021</a:t>
+              <a:t>9/20/2021</a:t>
             </a:fld>
             <a:endParaRPr lang="en-US" dirty="0"/>
           </a:p>
@@ -8848,7 +10079,7 @@
         <p:spPr>
           <a:xfrm>
             <a:off x="366003" y="2047823"/>
-            <a:ext cx="11681422" cy="2141227"/>
+            <a:ext cx="11681422" cy="1551322"/>
           </a:xfrm>
           <a:prstGeom prst="rect">
             <a:avLst/>
@@ -8897,7 +10128,7 @@
               <a:buChar char="•"/>
             </a:pPr>
             <a:r>
-              <a:rPr lang="en-US" sz="2000" dirty="0">
+              <a:rPr lang="en-US" sz="2000" b="1" dirty="0">
                 <a:solidFill>
                   <a:schemeClr val="bg2">
                     <a:lumMod val="75000"/>
@@ -8909,36 +10140,70 @@
               <a:t>Linear SVM</a:t>
             </a:r>
           </a:p>
-          <a:p>
-            <a:pPr marL="800100" lvl="1" indent="-342900" algn="just">
-              <a:lnSpc>
-                <a:spcPct val="150000"/>
-              </a:lnSpc>
-              <a:spcAft>
-                <a:spcPts val="1000"/>
-              </a:spcAft>
-              <a:buFont typeface="Arial" panose="020B0604020202020204" pitchFamily="34" charset="0"/>
-              <a:buChar char="•"/>
-            </a:pPr>
-            <a:r>
-              <a:rPr lang="en-US" sz="2000" dirty="0">
-                <a:solidFill>
-                  <a:schemeClr val="bg2">
-                    <a:lumMod val="75000"/>
-                  </a:schemeClr>
-                </a:solidFill>
-                <a:effectLst/>
-                <a:ea typeface="Times New Roman" panose="02020603050405020304" pitchFamily="18" charset="0"/>
-              </a:rPr>
-              <a:t>Non-linear SVM</a:t>
-            </a:r>
-          </a:p>
-        </p:txBody>
-      </p:sp>
+        </p:txBody>
+      </p:sp>
+      <p:pic>
+        <p:nvPicPr>
+          <p:cNvPr id="8" name="Picture 7" descr="Chart, scatter chart&#10;&#10;Description automatically generated">
+            <a:extLst>
+              <a:ext uri="{FF2B5EF4-FFF2-40B4-BE49-F238E27FC236}">
+                <a16:creationId xmlns:a16="http://schemas.microsoft.com/office/drawing/2014/main" id="{5BE66199-B109-4968-84CB-E3327C1E5C75}"/>
+              </a:ext>
+            </a:extLst>
+          </p:cNvPr>
+          <p:cNvPicPr/>
+          <p:nvPr/>
+        </p:nvPicPr>
+        <p:blipFill>
+          <a:blip r:embed="rId3"/>
+          <a:stretch>
+            <a:fillRect/>
+          </a:stretch>
+        </p:blipFill>
+        <p:spPr>
+          <a:xfrm>
+            <a:off x="1224597" y="4377847"/>
+            <a:ext cx="3799205" cy="1978025"/>
+          </a:xfrm>
+          <a:prstGeom prst="rect">
+            <a:avLst/>
+          </a:prstGeom>
+        </p:spPr>
+      </p:pic>
+      <p:pic>
+        <p:nvPicPr>
+          <p:cNvPr id="3" name="Picture 2">
+            <a:extLst>
+              <a:ext uri="{FF2B5EF4-FFF2-40B4-BE49-F238E27FC236}">
+                <a16:creationId xmlns:a16="http://schemas.microsoft.com/office/drawing/2014/main" id="{D2E09C54-6F66-436F-96D7-3D936BFC94DC}"/>
+              </a:ext>
+            </a:extLst>
+          </p:cNvPr>
+          <p:cNvPicPr>
+            <a:picLocks noChangeAspect="1"/>
+          </p:cNvPicPr>
+          <p:nvPr/>
+        </p:nvPicPr>
+        <p:blipFill>
+          <a:blip r:embed="rId4"/>
+          <a:stretch>
+            <a:fillRect/>
+          </a:stretch>
+        </p:blipFill>
+        <p:spPr>
+          <a:xfrm>
+            <a:off x="6096000" y="4810024"/>
+            <a:ext cx="4695825" cy="914400"/>
+          </a:xfrm>
+          <a:prstGeom prst="rect">
+            <a:avLst/>
+          </a:prstGeom>
+        </p:spPr>
+      </p:pic>
     </p:spTree>
     <p:extLst>
       <p:ext uri="{BB962C8B-B14F-4D97-AF65-F5344CB8AC3E}">
-        <p14:creationId xmlns:p14="http://schemas.microsoft.com/office/powerpoint/2010/main" val="2479243342"/>
+        <p14:creationId xmlns:p14="http://schemas.microsoft.com/office/powerpoint/2010/main" val="914479272"/>
       </p:ext>
     </p:extLst>
   </p:cSld>
@@ -9051,7 +10316,7 @@
             <a:pPr algn="l"/>
             <a:r>
               <a:rPr lang="en-US" sz="2400" dirty="0"/>
-              <a:t>Methodology</a:t>
+              <a:t>Theoretical Framework</a:t>
             </a:r>
           </a:p>
         </p:txBody>
@@ -9121,7 +10386,7 @@
         </p:nvSpPr>
         <p:spPr>
           <a:xfrm>
-            <a:off x="338569" y="1120784"/>
+            <a:off x="466016" y="1096215"/>
             <a:ext cx="11481396" cy="581249"/>
           </a:xfrm>
           <a:prstGeom prst="rect">
@@ -9147,7 +10412,7 @@
               </a:spcAft>
             </a:pPr>
             <a:r>
-              <a:rPr lang="en-US" sz="2400" dirty="0">
+              <a:rPr lang="en-US" sz="2400" b="1" dirty="0">
                 <a:solidFill>
                   <a:schemeClr val="bg2">
                     <a:lumMod val="75000"/>
@@ -9156,15 +10421,157 @@
                 <a:effectLst/>
                 <a:ea typeface="Times New Roman" panose="02020603050405020304" pitchFamily="18" charset="0"/>
               </a:rPr>
-              <a:t>The</a:t>
-            </a:r>
-          </a:p>
-        </p:txBody>
-      </p:sp>
+              <a:t>Support Vector Machines</a:t>
+            </a:r>
+          </a:p>
+        </p:txBody>
+      </p:sp>
+      <p:sp>
+        <p:nvSpPr>
+          <p:cNvPr id="7" name="TextBox 6">
+            <a:extLst>
+              <a:ext uri="{FF2B5EF4-FFF2-40B4-BE49-F238E27FC236}">
+                <a16:creationId xmlns:a16="http://schemas.microsoft.com/office/drawing/2014/main" id="{72B31422-82E1-41A5-BC9C-38585948D415}"/>
+              </a:ext>
+            </a:extLst>
+          </p:cNvPr>
+          <p:cNvSpPr txBox="1"/>
+          <p:nvPr/>
+        </p:nvSpPr>
+        <p:spPr>
+          <a:xfrm>
+            <a:off x="366003" y="2047823"/>
+            <a:ext cx="11681422" cy="1089657"/>
+          </a:xfrm>
+          <a:prstGeom prst="rect">
+            <a:avLst/>
+          </a:prstGeom>
+          <a:noFill/>
+        </p:spPr>
+        <p:txBody>
+          <a:bodyPr wrap="square" rtlCol="0">
+            <a:spAutoFit/>
+          </a:bodyPr>
+          <a:lstStyle/>
+          <a:p>
+            <a:pPr marL="800100" lvl="1" indent="-342900" algn="just">
+              <a:lnSpc>
+                <a:spcPct val="150000"/>
+              </a:lnSpc>
+              <a:spcAft>
+                <a:spcPts val="1000"/>
+              </a:spcAft>
+              <a:buFont typeface="Arial" panose="020B0604020202020204" pitchFamily="34" charset="0"/>
+              <a:buChar char="•"/>
+            </a:pPr>
+            <a:r>
+              <a:rPr lang="en-US" sz="2000" b="1" dirty="0">
+                <a:solidFill>
+                  <a:schemeClr val="bg2">
+                    <a:lumMod val="75000"/>
+                  </a:schemeClr>
+                </a:solidFill>
+                <a:effectLst/>
+                <a:ea typeface="Times New Roman" panose="02020603050405020304" pitchFamily="18" charset="0"/>
+              </a:rPr>
+              <a:t>Non-linear SVM</a:t>
+            </a:r>
+          </a:p>
+          <a:p>
+            <a:pPr lvl="1" algn="just">
+              <a:lnSpc>
+                <a:spcPct val="150000"/>
+              </a:lnSpc>
+              <a:spcAft>
+                <a:spcPts val="1000"/>
+              </a:spcAft>
+            </a:pPr>
+            <a:r>
+              <a:rPr lang="en-US" sz="2000" dirty="0">
+                <a:solidFill>
+                  <a:schemeClr val="bg2">
+                    <a:lumMod val="75000"/>
+                  </a:schemeClr>
+                </a:solidFill>
+                <a:ea typeface="Times New Roman" panose="02020603050405020304" pitchFamily="18" charset="0"/>
+              </a:rPr>
+              <a:t>	</a:t>
+            </a:r>
+            <a:r>
+              <a:rPr lang="en-US" sz="2000" dirty="0">
+                <a:solidFill>
+                  <a:schemeClr val="bg2">
+                    <a:lumMod val="75000"/>
+                  </a:schemeClr>
+                </a:solidFill>
+                <a:effectLst/>
+                <a:ea typeface="Times New Roman" panose="02020603050405020304" pitchFamily="18" charset="0"/>
+              </a:rPr>
+              <a:t>The SVM kernel function translates a lower-dimensional input space to a higher-dimensional space. </a:t>
+            </a:r>
+          </a:p>
+        </p:txBody>
+      </p:sp>
+      <p:pic>
+        <p:nvPicPr>
+          <p:cNvPr id="11" name="Picture 10" descr="Chart, scatter chart&#10;&#10;Description automatically generated">
+            <a:extLst>
+              <a:ext uri="{FF2B5EF4-FFF2-40B4-BE49-F238E27FC236}">
+                <a16:creationId xmlns:a16="http://schemas.microsoft.com/office/drawing/2014/main" id="{3E259257-41C9-4E04-A71D-9245E0D6551D}"/>
+              </a:ext>
+            </a:extLst>
+          </p:cNvPr>
+          <p:cNvPicPr/>
+          <p:nvPr/>
+        </p:nvPicPr>
+        <p:blipFill>
+          <a:blip r:embed="rId3"/>
+          <a:stretch>
+            <a:fillRect/>
+          </a:stretch>
+        </p:blipFill>
+        <p:spPr>
+          <a:xfrm>
+            <a:off x="1674813" y="3544931"/>
+            <a:ext cx="2984500" cy="2680335"/>
+          </a:xfrm>
+          <a:prstGeom prst="rect">
+            <a:avLst/>
+          </a:prstGeom>
+        </p:spPr>
+      </p:pic>
+      <p:pic>
+        <p:nvPicPr>
+          <p:cNvPr id="13" name="Picture 12" descr="A picture containing scatter chart&#10;&#10;Description automatically generated">
+            <a:extLst>
+              <a:ext uri="{FF2B5EF4-FFF2-40B4-BE49-F238E27FC236}">
+                <a16:creationId xmlns:a16="http://schemas.microsoft.com/office/drawing/2014/main" id="{2947D954-E0DD-4338-835C-934320BB7B09}"/>
+              </a:ext>
+            </a:extLst>
+          </p:cNvPr>
+          <p:cNvPicPr/>
+          <p:nvPr/>
+        </p:nvPicPr>
+        <p:blipFill>
+          <a:blip r:embed="rId4"/>
+          <a:stretch>
+            <a:fillRect/>
+          </a:stretch>
+        </p:blipFill>
+        <p:spPr>
+          <a:xfrm>
+            <a:off x="7304087" y="3590235"/>
+            <a:ext cx="3213100" cy="2830195"/>
+          </a:xfrm>
+          <a:prstGeom prst="rect">
+            <a:avLst/>
+          </a:prstGeom>
+        </p:spPr>
+      </p:pic>
     </p:spTree>
     <p:extLst>
       <p:ext uri="{BB962C8B-B14F-4D97-AF65-F5344CB8AC3E}">
-        <p14:creationId xmlns:p14="http://schemas.microsoft.com/office/powerpoint/2010/main" val="8784207"/>
+        <p14:creationId xmlns:p14="http://schemas.microsoft.com/office/powerpoint/2010/main" val="4264337170"/>
       </p:ext>
     </p:extLst>
   </p:cSld>
@@ -9174,7 +10581,7 @@
 </p:sld>
 </file>
 
-<file path=ppt/slides/slide2.xml><?xml version="1.0" encoding="utf-8"?>
+<file path=ppt/slides/slide18.xml><?xml version="1.0" encoding="utf-8"?>
 <p:sld xmlns:a="http://schemas.openxmlformats.org/drawingml/2006/main" xmlns:r="http://schemas.openxmlformats.org/officeDocument/2006/relationships" xmlns:p="http://schemas.openxmlformats.org/presentationml/2006/main">
   <p:cSld>
     <p:spTree>
@@ -9248,6 +10655,627 @@
       </p:sp>
       <p:sp>
         <p:nvSpPr>
+          <p:cNvPr id="9" name="Subtitle 8">
+            <a:extLst>
+              <a:ext uri="{FF2B5EF4-FFF2-40B4-BE49-F238E27FC236}">
+                <a16:creationId xmlns:a16="http://schemas.microsoft.com/office/drawing/2014/main" id="{A3ADA07F-B1C8-45EA-8245-77BAA14ADC9C}"/>
+              </a:ext>
+            </a:extLst>
+          </p:cNvPr>
+          <p:cNvSpPr>
+            <a:spLocks noGrp="1"/>
+          </p:cNvSpPr>
+          <p:nvPr>
+            <p:ph type="subTitle" idx="1"/>
+          </p:nvPr>
+        </p:nvSpPr>
+        <p:spPr>
+          <a:xfrm>
+            <a:off x="244588" y="186955"/>
+            <a:ext cx="6801612" cy="1239894"/>
+          </a:xfrm>
+        </p:spPr>
+        <p:txBody>
+          <a:bodyPr>
+            <a:normAutofit/>
+          </a:bodyPr>
+          <a:lstStyle/>
+          <a:p>
+            <a:pPr algn="l"/>
+            <a:r>
+              <a:rPr lang="en-US" sz="2400" dirty="0"/>
+              <a:t>Theoretical Framework</a:t>
+            </a:r>
+          </a:p>
+        </p:txBody>
+      </p:sp>
+      <p:sp>
+        <p:nvSpPr>
+          <p:cNvPr id="6" name="TextBox 5">
+            <a:extLst>
+              <a:ext uri="{FF2B5EF4-FFF2-40B4-BE49-F238E27FC236}">
+                <a16:creationId xmlns:a16="http://schemas.microsoft.com/office/drawing/2014/main" id="{8219429D-BCFB-4B48-8143-319EDB44DEC9}"/>
+              </a:ext>
+            </a:extLst>
+          </p:cNvPr>
+          <p:cNvSpPr txBox="1"/>
+          <p:nvPr/>
+        </p:nvSpPr>
+        <p:spPr>
+          <a:xfrm>
+            <a:off x="5931188" y="437570"/>
+            <a:ext cx="6505400" cy="369332"/>
+          </a:xfrm>
+          <a:prstGeom prst="rect">
+            <a:avLst/>
+          </a:prstGeom>
+          <a:noFill/>
+        </p:spPr>
+        <p:txBody>
+          <a:bodyPr wrap="square" rtlCol="0">
+            <a:spAutoFit/>
+          </a:bodyPr>
+          <a:lstStyle/>
+          <a:p>
+            <a:r>
+              <a:rPr lang="en-US" dirty="0">
+                <a:solidFill>
+                  <a:schemeClr val="tx1">
+                    <a:lumMod val="75000"/>
+                  </a:schemeClr>
+                </a:solidFill>
+                <a:effectLst/>
+                <a:latin typeface="Times New Roman" panose="02020603050405020304" pitchFamily="18" charset="0"/>
+                <a:ea typeface="Times New Roman" panose="02020603050405020304" pitchFamily="18" charset="0"/>
+              </a:rPr>
+              <a:t>An Integration of Machine Learning on Software Bug Reporting</a:t>
+            </a:r>
+            <a:endParaRPr lang="en-US" dirty="0">
+              <a:solidFill>
+                <a:schemeClr val="tx1">
+                  <a:lumMod val="75000"/>
+                </a:schemeClr>
+              </a:solidFill>
+            </a:endParaRPr>
+          </a:p>
+        </p:txBody>
+      </p:sp>
+      <p:sp>
+        <p:nvSpPr>
+          <p:cNvPr id="11" name="TextBox 10">
+            <a:extLst>
+              <a:ext uri="{FF2B5EF4-FFF2-40B4-BE49-F238E27FC236}">
+                <a16:creationId xmlns:a16="http://schemas.microsoft.com/office/drawing/2014/main" id="{F0807B21-2FB7-4509-B80B-DF7865AA8B2F}"/>
+              </a:ext>
+            </a:extLst>
+          </p:cNvPr>
+          <p:cNvSpPr txBox="1"/>
+          <p:nvPr/>
+        </p:nvSpPr>
+        <p:spPr>
+          <a:xfrm>
+            <a:off x="244588" y="1120628"/>
+            <a:ext cx="11481396" cy="581249"/>
+          </a:xfrm>
+          <a:prstGeom prst="rect">
+            <a:avLst/>
+          </a:prstGeom>
+          <a:noFill/>
+        </p:spPr>
+        <p:txBody>
+          <a:bodyPr wrap="square" rtlCol="0">
+            <a:spAutoFit/>
+          </a:bodyPr>
+          <a:lstStyle/>
+          <a:p>
+            <a:pPr marL="0" marR="0" indent="457200" algn="just">
+              <a:lnSpc>
+                <a:spcPct val="150000"/>
+              </a:lnSpc>
+              <a:spcBef>
+                <a:spcPts val="0"/>
+              </a:spcBef>
+              <a:spcAft>
+                <a:spcPts val="1000"/>
+              </a:spcAft>
+            </a:pPr>
+            <a:r>
+              <a:rPr lang="en-US" sz="2400" b="1" dirty="0">
+                <a:solidFill>
+                  <a:schemeClr val="bg2">
+                    <a:lumMod val="75000"/>
+                  </a:schemeClr>
+                </a:solidFill>
+                <a:effectLst/>
+                <a:ea typeface="Times New Roman" panose="02020603050405020304" pitchFamily="18" charset="0"/>
+              </a:rPr>
+              <a:t>Multiclass SVM</a:t>
+            </a:r>
+          </a:p>
+        </p:txBody>
+      </p:sp>
+      <p:sp>
+        <p:nvSpPr>
+          <p:cNvPr id="13" name="TextBox 12">
+            <a:extLst>
+              <a:ext uri="{FF2B5EF4-FFF2-40B4-BE49-F238E27FC236}">
+                <a16:creationId xmlns:a16="http://schemas.microsoft.com/office/drawing/2014/main" id="{09E890DE-1A96-4A14-91E3-A9644996CE0A}"/>
+              </a:ext>
+            </a:extLst>
+          </p:cNvPr>
+          <p:cNvSpPr txBox="1"/>
+          <p:nvPr/>
+        </p:nvSpPr>
+        <p:spPr>
+          <a:xfrm>
+            <a:off x="510578" y="1952492"/>
+            <a:ext cx="11215406" cy="1551322"/>
+          </a:xfrm>
+          <a:prstGeom prst="rect">
+            <a:avLst/>
+          </a:prstGeom>
+          <a:noFill/>
+        </p:spPr>
+        <p:txBody>
+          <a:bodyPr wrap="square" rtlCol="0">
+            <a:spAutoFit/>
+          </a:bodyPr>
+          <a:lstStyle/>
+          <a:p>
+            <a:pPr marR="0" algn="just">
+              <a:lnSpc>
+                <a:spcPct val="150000"/>
+              </a:lnSpc>
+              <a:spcBef>
+                <a:spcPts val="0"/>
+              </a:spcBef>
+              <a:spcAft>
+                <a:spcPts val="1000"/>
+              </a:spcAft>
+            </a:pPr>
+            <a:r>
+              <a:rPr lang="en-US" sz="2000" dirty="0">
+                <a:solidFill>
+                  <a:schemeClr val="bg2">
+                    <a:lumMod val="75000"/>
+                  </a:schemeClr>
+                </a:solidFill>
+                <a:effectLst/>
+                <a:ea typeface="Times New Roman" panose="02020603050405020304" pitchFamily="18" charset="0"/>
+              </a:rPr>
+              <a:t>In case of Multi-class classification problems, the issue becomes more complex because the outputs could be more than one class and must be divided into </a:t>
+            </a:r>
+            <a:r>
+              <a:rPr lang="en-US" sz="2000" b="1" i="1" dirty="0">
+                <a:solidFill>
+                  <a:schemeClr val="bg2">
+                    <a:lumMod val="75000"/>
+                  </a:schemeClr>
+                </a:solidFill>
+                <a:effectLst/>
+                <a:ea typeface="Times New Roman" panose="02020603050405020304" pitchFamily="18" charset="0"/>
+              </a:rPr>
+              <a:t>M</a:t>
+            </a:r>
+            <a:r>
+              <a:rPr lang="en-US" sz="2000" dirty="0">
+                <a:solidFill>
+                  <a:schemeClr val="bg2">
+                    <a:lumMod val="75000"/>
+                  </a:schemeClr>
+                </a:solidFill>
+                <a:effectLst/>
+                <a:ea typeface="Times New Roman" panose="02020603050405020304" pitchFamily="18" charset="0"/>
+              </a:rPr>
+              <a:t> mutually exclusive classes.</a:t>
+            </a:r>
+          </a:p>
+          <a:p>
+            <a:pPr marR="0" algn="just">
+              <a:lnSpc>
+                <a:spcPct val="150000"/>
+              </a:lnSpc>
+              <a:spcBef>
+                <a:spcPts val="0"/>
+              </a:spcBef>
+              <a:spcAft>
+                <a:spcPts val="1000"/>
+              </a:spcAft>
+            </a:pPr>
+            <a:r>
+              <a:rPr lang="en-US" sz="2000" dirty="0">
+                <a:solidFill>
+                  <a:schemeClr val="bg2">
+                    <a:lumMod val="75000"/>
+                  </a:schemeClr>
+                </a:solidFill>
+                <a:effectLst/>
+                <a:ea typeface="Times New Roman" panose="02020603050405020304" pitchFamily="18" charset="0"/>
+              </a:rPr>
+              <a:t>Multi-class SVMs (MCSVM) are usually implemented by combining several binary SVMs</a:t>
+            </a:r>
+          </a:p>
+        </p:txBody>
+      </p:sp>
+      <p:pic>
+        <p:nvPicPr>
+          <p:cNvPr id="3" name="Picture 2">
+            <a:extLst>
+              <a:ext uri="{FF2B5EF4-FFF2-40B4-BE49-F238E27FC236}">
+                <a16:creationId xmlns:a16="http://schemas.microsoft.com/office/drawing/2014/main" id="{666BE231-98CA-4ACE-92AA-813B188EA9DA}"/>
+              </a:ext>
+            </a:extLst>
+          </p:cNvPr>
+          <p:cNvPicPr>
+            <a:picLocks noChangeAspect="1"/>
+          </p:cNvPicPr>
+          <p:nvPr/>
+        </p:nvPicPr>
+        <p:blipFill>
+          <a:blip r:embed="rId3"/>
+          <a:stretch>
+            <a:fillRect/>
+          </a:stretch>
+        </p:blipFill>
+        <p:spPr>
+          <a:xfrm>
+            <a:off x="4757738" y="3754429"/>
+            <a:ext cx="3238499" cy="2747298"/>
+          </a:xfrm>
+          <a:prstGeom prst="rect">
+            <a:avLst/>
+          </a:prstGeom>
+        </p:spPr>
+      </p:pic>
+    </p:spTree>
+    <p:extLst>
+      <p:ext uri="{BB962C8B-B14F-4D97-AF65-F5344CB8AC3E}">
+        <p14:creationId xmlns:p14="http://schemas.microsoft.com/office/powerpoint/2010/main" val="2479243342"/>
+      </p:ext>
+    </p:extLst>
+  </p:cSld>
+  <p:clrMapOvr>
+    <a:masterClrMapping/>
+  </p:clrMapOvr>
+</p:sld>
+</file>
+
+<file path=ppt/slides/slide19.xml><?xml version="1.0" encoding="utf-8"?>
+<p:sld xmlns:a="http://schemas.openxmlformats.org/drawingml/2006/main" xmlns:r="http://schemas.openxmlformats.org/officeDocument/2006/relationships" xmlns:p="http://schemas.openxmlformats.org/presentationml/2006/main">
+  <p:cSld>
+    <p:spTree>
+      <p:nvGrpSpPr>
+        <p:cNvPr id="1" name=""/>
+        <p:cNvGrpSpPr/>
+        <p:nvPr/>
+      </p:nvGrpSpPr>
+      <p:grpSpPr>
+        <a:xfrm>
+          <a:off x="0" y="0"/>
+          <a:ext cx="0" cy="0"/>
+          <a:chOff x="0" y="0"/>
+          <a:chExt cx="0" cy="0"/>
+        </a:xfrm>
+      </p:grpSpPr>
+      <p:sp>
+        <p:nvSpPr>
+          <p:cNvPr id="10" name="Rectangle 9">
+            <a:extLst>
+              <a:ext uri="{FF2B5EF4-FFF2-40B4-BE49-F238E27FC236}">
+                <a16:creationId xmlns:a16="http://schemas.microsoft.com/office/drawing/2014/main" id="{C676DEBF-3901-4991-9B31-4E84BF58CA7B}"/>
+              </a:ext>
+            </a:extLst>
+          </p:cNvPr>
+          <p:cNvSpPr/>
+          <p:nvPr/>
+        </p:nvSpPr>
+        <p:spPr>
+          <a:xfrm>
+            <a:off x="0" y="1"/>
+            <a:ext cx="12192000" cy="870012"/>
+          </a:xfrm>
+          <a:prstGeom prst="rect">
+            <a:avLst/>
+          </a:prstGeom>
+          <a:solidFill>
+            <a:schemeClr val="bg1">
+              <a:lumMod val="75000"/>
+              <a:lumOff val="25000"/>
+            </a:schemeClr>
+          </a:solidFill>
+          <a:ln>
+            <a:noFill/>
+          </a:ln>
+        </p:spPr>
+        <p:style>
+          <a:lnRef idx="2">
+            <a:schemeClr val="accent1">
+              <a:shade val="50000"/>
+            </a:schemeClr>
+          </a:lnRef>
+          <a:fillRef idx="1">
+            <a:schemeClr val="accent1"/>
+          </a:fillRef>
+          <a:effectRef idx="0">
+            <a:schemeClr val="accent1"/>
+          </a:effectRef>
+          <a:fontRef idx="minor">
+            <a:schemeClr val="lt1"/>
+          </a:fontRef>
+        </p:style>
+        <p:txBody>
+          <a:bodyPr rtlCol="0" anchor="ctr"/>
+          <a:lstStyle/>
+          <a:p>
+            <a:pPr algn="ctr"/>
+            <a:endParaRPr lang="en-US"/>
+          </a:p>
+        </p:txBody>
+      </p:sp>
+      <p:sp>
+        <p:nvSpPr>
+          <p:cNvPr id="9" name="Subtitle 8">
+            <a:extLst>
+              <a:ext uri="{FF2B5EF4-FFF2-40B4-BE49-F238E27FC236}">
+                <a16:creationId xmlns:a16="http://schemas.microsoft.com/office/drawing/2014/main" id="{A3ADA07F-B1C8-45EA-8245-77BAA14ADC9C}"/>
+              </a:ext>
+            </a:extLst>
+          </p:cNvPr>
+          <p:cNvSpPr>
+            <a:spLocks noGrp="1"/>
+          </p:cNvSpPr>
+          <p:nvPr>
+            <p:ph type="subTitle" idx="1"/>
+          </p:nvPr>
+        </p:nvSpPr>
+        <p:spPr>
+          <a:xfrm>
+            <a:off x="244588" y="186955"/>
+            <a:ext cx="6801612" cy="1239894"/>
+          </a:xfrm>
+        </p:spPr>
+        <p:txBody>
+          <a:bodyPr>
+            <a:normAutofit/>
+          </a:bodyPr>
+          <a:lstStyle/>
+          <a:p>
+            <a:pPr algn="l"/>
+            <a:r>
+              <a:rPr lang="en-US" sz="2400" dirty="0"/>
+              <a:t>Methodology</a:t>
+            </a:r>
+          </a:p>
+        </p:txBody>
+      </p:sp>
+      <p:sp>
+        <p:nvSpPr>
+          <p:cNvPr id="6" name="TextBox 5">
+            <a:extLst>
+              <a:ext uri="{FF2B5EF4-FFF2-40B4-BE49-F238E27FC236}">
+                <a16:creationId xmlns:a16="http://schemas.microsoft.com/office/drawing/2014/main" id="{8219429D-BCFB-4B48-8143-319EDB44DEC9}"/>
+              </a:ext>
+            </a:extLst>
+          </p:cNvPr>
+          <p:cNvSpPr txBox="1"/>
+          <p:nvPr/>
+        </p:nvSpPr>
+        <p:spPr>
+          <a:xfrm>
+            <a:off x="5931188" y="437570"/>
+            <a:ext cx="6505400" cy="369332"/>
+          </a:xfrm>
+          <a:prstGeom prst="rect">
+            <a:avLst/>
+          </a:prstGeom>
+          <a:noFill/>
+        </p:spPr>
+        <p:txBody>
+          <a:bodyPr wrap="square" rtlCol="0">
+            <a:spAutoFit/>
+          </a:bodyPr>
+          <a:lstStyle/>
+          <a:p>
+            <a:r>
+              <a:rPr lang="en-US" dirty="0">
+                <a:solidFill>
+                  <a:schemeClr val="tx1">
+                    <a:lumMod val="75000"/>
+                  </a:schemeClr>
+                </a:solidFill>
+                <a:effectLst/>
+                <a:latin typeface="Times New Roman" panose="02020603050405020304" pitchFamily="18" charset="0"/>
+                <a:ea typeface="Times New Roman" panose="02020603050405020304" pitchFamily="18" charset="0"/>
+              </a:rPr>
+              <a:t>An Integration of Machine Learning on Software Bug Reporting</a:t>
+            </a:r>
+            <a:endParaRPr lang="en-US" dirty="0">
+              <a:solidFill>
+                <a:schemeClr val="tx1">
+                  <a:lumMod val="75000"/>
+                </a:schemeClr>
+              </a:solidFill>
+            </a:endParaRPr>
+          </a:p>
+        </p:txBody>
+      </p:sp>
+      <p:pic>
+        <p:nvPicPr>
+          <p:cNvPr id="8" name="Picture 7" descr="Diagram&#10;&#10;Description automatically generated">
+            <a:extLst>
+              <a:ext uri="{FF2B5EF4-FFF2-40B4-BE49-F238E27FC236}">
+                <a16:creationId xmlns:a16="http://schemas.microsoft.com/office/drawing/2014/main" id="{50E21BEF-D2BF-424C-BD1F-37F4E3992D9C}"/>
+              </a:ext>
+            </a:extLst>
+          </p:cNvPr>
+          <p:cNvPicPr/>
+          <p:nvPr/>
+        </p:nvPicPr>
+        <p:blipFill>
+          <a:blip r:embed="rId3"/>
+          <a:stretch>
+            <a:fillRect/>
+          </a:stretch>
+        </p:blipFill>
+        <p:spPr>
+          <a:xfrm>
+            <a:off x="4444682" y="1298257"/>
+            <a:ext cx="3302635" cy="4261485"/>
+          </a:xfrm>
+          <a:prstGeom prst="rect">
+            <a:avLst/>
+          </a:prstGeom>
+        </p:spPr>
+      </p:pic>
+      <p:sp>
+        <p:nvSpPr>
+          <p:cNvPr id="11" name="TextBox 10">
+            <a:extLst>
+              <a:ext uri="{FF2B5EF4-FFF2-40B4-BE49-F238E27FC236}">
+                <a16:creationId xmlns:a16="http://schemas.microsoft.com/office/drawing/2014/main" id="{FABC3F6E-BBAD-4C19-AD57-784E8F691753}"/>
+              </a:ext>
+            </a:extLst>
+          </p:cNvPr>
+          <p:cNvSpPr txBox="1"/>
+          <p:nvPr/>
+        </p:nvSpPr>
+        <p:spPr>
+          <a:xfrm>
+            <a:off x="0" y="5839181"/>
+            <a:ext cx="11481396" cy="581249"/>
+          </a:xfrm>
+          <a:prstGeom prst="rect">
+            <a:avLst/>
+          </a:prstGeom>
+          <a:noFill/>
+        </p:spPr>
+        <p:txBody>
+          <a:bodyPr wrap="square" rtlCol="0">
+            <a:spAutoFit/>
+          </a:bodyPr>
+          <a:lstStyle/>
+          <a:p>
+            <a:pPr marL="0" marR="0" indent="457200" algn="ctr">
+              <a:lnSpc>
+                <a:spcPct val="150000"/>
+              </a:lnSpc>
+              <a:spcBef>
+                <a:spcPts val="0"/>
+              </a:spcBef>
+              <a:spcAft>
+                <a:spcPts val="1000"/>
+              </a:spcAft>
+            </a:pPr>
+            <a:r>
+              <a:rPr lang="en-US" sz="2400" b="1" dirty="0">
+                <a:solidFill>
+                  <a:schemeClr val="bg2">
+                    <a:lumMod val="75000"/>
+                  </a:schemeClr>
+                </a:solidFill>
+                <a:ea typeface="Times New Roman" panose="02020603050405020304" pitchFamily="18" charset="0"/>
+              </a:rPr>
+              <a:t>Conceptual Framework</a:t>
+            </a:r>
+            <a:endParaRPr lang="en-US" sz="2400" b="1" dirty="0">
+              <a:solidFill>
+                <a:schemeClr val="bg2">
+                  <a:lumMod val="75000"/>
+                </a:schemeClr>
+              </a:solidFill>
+              <a:effectLst/>
+              <a:ea typeface="Times New Roman" panose="02020603050405020304" pitchFamily="18" charset="0"/>
+            </a:endParaRPr>
+          </a:p>
+        </p:txBody>
+      </p:sp>
+    </p:spTree>
+    <p:extLst>
+      <p:ext uri="{BB962C8B-B14F-4D97-AF65-F5344CB8AC3E}">
+        <p14:creationId xmlns:p14="http://schemas.microsoft.com/office/powerpoint/2010/main" val="8784207"/>
+      </p:ext>
+    </p:extLst>
+  </p:cSld>
+  <p:clrMapOvr>
+    <a:masterClrMapping/>
+  </p:clrMapOvr>
+</p:sld>
+</file>
+
+<file path=ppt/slides/slide2.xml><?xml version="1.0" encoding="utf-8"?>
+<p:sld xmlns:a="http://schemas.openxmlformats.org/drawingml/2006/main" xmlns:r="http://schemas.openxmlformats.org/officeDocument/2006/relationships" xmlns:p="http://schemas.openxmlformats.org/presentationml/2006/main">
+  <p:cSld>
+    <p:spTree>
+      <p:nvGrpSpPr>
+        <p:cNvPr id="1" name=""/>
+        <p:cNvGrpSpPr/>
+        <p:nvPr/>
+      </p:nvGrpSpPr>
+      <p:grpSpPr>
+        <a:xfrm>
+          <a:off x="0" y="0"/>
+          <a:ext cx="0" cy="0"/>
+          <a:chOff x="0" y="0"/>
+          <a:chExt cx="0" cy="0"/>
+        </a:xfrm>
+      </p:grpSpPr>
+      <p:sp>
+        <p:nvSpPr>
+          <p:cNvPr id="10" name="Rectangle 9">
+            <a:extLst>
+              <a:ext uri="{FF2B5EF4-FFF2-40B4-BE49-F238E27FC236}">
+                <a16:creationId xmlns:a16="http://schemas.microsoft.com/office/drawing/2014/main" id="{C676DEBF-3901-4991-9B31-4E84BF58CA7B}"/>
+              </a:ext>
+            </a:extLst>
+          </p:cNvPr>
+          <p:cNvSpPr/>
+          <p:nvPr/>
+        </p:nvSpPr>
+        <p:spPr>
+          <a:xfrm>
+            <a:off x="0" y="1"/>
+            <a:ext cx="12192000" cy="870012"/>
+          </a:xfrm>
+          <a:prstGeom prst="rect">
+            <a:avLst/>
+          </a:prstGeom>
+          <a:solidFill>
+            <a:schemeClr val="bg1">
+              <a:lumMod val="75000"/>
+              <a:lumOff val="25000"/>
+            </a:schemeClr>
+          </a:solidFill>
+          <a:ln>
+            <a:noFill/>
+          </a:ln>
+        </p:spPr>
+        <p:style>
+          <a:lnRef idx="2">
+            <a:schemeClr val="accent1">
+              <a:shade val="50000"/>
+            </a:schemeClr>
+          </a:lnRef>
+          <a:fillRef idx="1">
+            <a:schemeClr val="accent1"/>
+          </a:fillRef>
+          <a:effectRef idx="0">
+            <a:schemeClr val="accent1"/>
+          </a:effectRef>
+          <a:fontRef idx="minor">
+            <a:schemeClr val="lt1"/>
+          </a:fontRef>
+        </p:style>
+        <p:txBody>
+          <a:bodyPr rtlCol="0" anchor="ctr"/>
+          <a:lstStyle/>
+          <a:p>
+            <a:pPr algn="ctr"/>
+            <a:endParaRPr lang="en-US"/>
+          </a:p>
+        </p:txBody>
+      </p:sp>
+      <p:sp>
+        <p:nvSpPr>
           <p:cNvPr id="5" name="Subtitle 2">
             <a:extLst>
               <a:ext uri="{FF2B5EF4-FFF2-40B4-BE49-F238E27FC236}">
@@ -9545,7 +11573,7 @@
                   </a:schemeClr>
                 </a:solidFill>
               </a:rPr>
-              <a:t>- Literature Map?</a:t>
+              <a:t>- Literature Mapping</a:t>
             </a:r>
           </a:p>
           <a:p>
@@ -9675,6 +11703,432 @@
     <p:extLst>
       <p:ext uri="{BB962C8B-B14F-4D97-AF65-F5344CB8AC3E}">
         <p14:creationId xmlns:p14="http://schemas.microsoft.com/office/powerpoint/2010/main" val="2656461504"/>
+      </p:ext>
+    </p:extLst>
+  </p:cSld>
+  <p:clrMapOvr>
+    <a:masterClrMapping/>
+  </p:clrMapOvr>
+</p:sld>
+</file>
+
+<file path=ppt/slides/slide20.xml><?xml version="1.0" encoding="utf-8"?>
+<p:sld xmlns:a="http://schemas.openxmlformats.org/drawingml/2006/main" xmlns:r="http://schemas.openxmlformats.org/officeDocument/2006/relationships" xmlns:p="http://schemas.openxmlformats.org/presentationml/2006/main">
+  <p:cSld>
+    <p:spTree>
+      <p:nvGrpSpPr>
+        <p:cNvPr id="1" name=""/>
+        <p:cNvGrpSpPr/>
+        <p:nvPr/>
+      </p:nvGrpSpPr>
+      <p:grpSpPr>
+        <a:xfrm>
+          <a:off x="0" y="0"/>
+          <a:ext cx="0" cy="0"/>
+          <a:chOff x="0" y="0"/>
+          <a:chExt cx="0" cy="0"/>
+        </a:xfrm>
+      </p:grpSpPr>
+      <p:sp>
+        <p:nvSpPr>
+          <p:cNvPr id="10" name="Rectangle 9">
+            <a:extLst>
+              <a:ext uri="{FF2B5EF4-FFF2-40B4-BE49-F238E27FC236}">
+                <a16:creationId xmlns:a16="http://schemas.microsoft.com/office/drawing/2014/main" id="{C676DEBF-3901-4991-9B31-4E84BF58CA7B}"/>
+              </a:ext>
+            </a:extLst>
+          </p:cNvPr>
+          <p:cNvSpPr/>
+          <p:nvPr/>
+        </p:nvSpPr>
+        <p:spPr>
+          <a:xfrm>
+            <a:off x="0" y="1"/>
+            <a:ext cx="12192000" cy="870012"/>
+          </a:xfrm>
+          <a:prstGeom prst="rect">
+            <a:avLst/>
+          </a:prstGeom>
+          <a:solidFill>
+            <a:schemeClr val="bg1">
+              <a:lumMod val="75000"/>
+              <a:lumOff val="25000"/>
+            </a:schemeClr>
+          </a:solidFill>
+          <a:ln>
+            <a:noFill/>
+          </a:ln>
+        </p:spPr>
+        <p:style>
+          <a:lnRef idx="2">
+            <a:schemeClr val="accent1">
+              <a:shade val="50000"/>
+            </a:schemeClr>
+          </a:lnRef>
+          <a:fillRef idx="1">
+            <a:schemeClr val="accent1"/>
+          </a:fillRef>
+          <a:effectRef idx="0">
+            <a:schemeClr val="accent1"/>
+          </a:effectRef>
+          <a:fontRef idx="minor">
+            <a:schemeClr val="lt1"/>
+          </a:fontRef>
+        </p:style>
+        <p:txBody>
+          <a:bodyPr rtlCol="0" anchor="ctr"/>
+          <a:lstStyle/>
+          <a:p>
+            <a:pPr algn="ctr"/>
+            <a:endParaRPr lang="en-US"/>
+          </a:p>
+        </p:txBody>
+      </p:sp>
+      <p:sp>
+        <p:nvSpPr>
+          <p:cNvPr id="9" name="Subtitle 8">
+            <a:extLst>
+              <a:ext uri="{FF2B5EF4-FFF2-40B4-BE49-F238E27FC236}">
+                <a16:creationId xmlns:a16="http://schemas.microsoft.com/office/drawing/2014/main" id="{A3ADA07F-B1C8-45EA-8245-77BAA14ADC9C}"/>
+              </a:ext>
+            </a:extLst>
+          </p:cNvPr>
+          <p:cNvSpPr>
+            <a:spLocks noGrp="1"/>
+          </p:cNvSpPr>
+          <p:nvPr>
+            <p:ph type="subTitle" idx="1"/>
+          </p:nvPr>
+        </p:nvSpPr>
+        <p:spPr>
+          <a:xfrm>
+            <a:off x="244588" y="186955"/>
+            <a:ext cx="6801612" cy="1239894"/>
+          </a:xfrm>
+        </p:spPr>
+        <p:txBody>
+          <a:bodyPr>
+            <a:normAutofit/>
+          </a:bodyPr>
+          <a:lstStyle/>
+          <a:p>
+            <a:pPr algn="l"/>
+            <a:r>
+              <a:rPr lang="en-US" sz="2400" dirty="0"/>
+              <a:t>Methodology</a:t>
+            </a:r>
+          </a:p>
+        </p:txBody>
+      </p:sp>
+      <p:sp>
+        <p:nvSpPr>
+          <p:cNvPr id="6" name="TextBox 5">
+            <a:extLst>
+              <a:ext uri="{FF2B5EF4-FFF2-40B4-BE49-F238E27FC236}">
+                <a16:creationId xmlns:a16="http://schemas.microsoft.com/office/drawing/2014/main" id="{8219429D-BCFB-4B48-8143-319EDB44DEC9}"/>
+              </a:ext>
+            </a:extLst>
+          </p:cNvPr>
+          <p:cNvSpPr txBox="1"/>
+          <p:nvPr/>
+        </p:nvSpPr>
+        <p:spPr>
+          <a:xfrm>
+            <a:off x="5931188" y="437570"/>
+            <a:ext cx="6505400" cy="369332"/>
+          </a:xfrm>
+          <a:prstGeom prst="rect">
+            <a:avLst/>
+          </a:prstGeom>
+          <a:noFill/>
+        </p:spPr>
+        <p:txBody>
+          <a:bodyPr wrap="square" rtlCol="0">
+            <a:spAutoFit/>
+          </a:bodyPr>
+          <a:lstStyle/>
+          <a:p>
+            <a:r>
+              <a:rPr lang="en-US" dirty="0">
+                <a:solidFill>
+                  <a:schemeClr val="tx1">
+                    <a:lumMod val="75000"/>
+                  </a:schemeClr>
+                </a:solidFill>
+                <a:effectLst/>
+                <a:latin typeface="Times New Roman" panose="02020603050405020304" pitchFamily="18" charset="0"/>
+                <a:ea typeface="Times New Roman" panose="02020603050405020304" pitchFamily="18" charset="0"/>
+              </a:rPr>
+              <a:t>An Integration of Machine Learning on Software Bug Reporting</a:t>
+            </a:r>
+            <a:endParaRPr lang="en-US" dirty="0">
+              <a:solidFill>
+                <a:schemeClr val="tx1">
+                  <a:lumMod val="75000"/>
+                </a:schemeClr>
+              </a:solidFill>
+            </a:endParaRPr>
+          </a:p>
+        </p:txBody>
+      </p:sp>
+      <p:sp>
+        <p:nvSpPr>
+          <p:cNvPr id="11" name="TextBox 10">
+            <a:extLst>
+              <a:ext uri="{FF2B5EF4-FFF2-40B4-BE49-F238E27FC236}">
+                <a16:creationId xmlns:a16="http://schemas.microsoft.com/office/drawing/2014/main" id="{380FA95E-30C9-4A9E-88AC-AB761461D3AC}"/>
+              </a:ext>
+            </a:extLst>
+          </p:cNvPr>
+          <p:cNvSpPr txBox="1"/>
+          <p:nvPr/>
+        </p:nvSpPr>
+        <p:spPr>
+          <a:xfrm>
+            <a:off x="-339239" y="1136224"/>
+            <a:ext cx="4837708" cy="581249"/>
+          </a:xfrm>
+          <a:prstGeom prst="rect">
+            <a:avLst/>
+          </a:prstGeom>
+          <a:noFill/>
+        </p:spPr>
+        <p:txBody>
+          <a:bodyPr wrap="square" rtlCol="0">
+            <a:spAutoFit/>
+          </a:bodyPr>
+          <a:lstStyle/>
+          <a:p>
+            <a:pPr marL="0" marR="0" indent="457200" algn="ctr">
+              <a:lnSpc>
+                <a:spcPct val="150000"/>
+              </a:lnSpc>
+              <a:spcBef>
+                <a:spcPts val="0"/>
+              </a:spcBef>
+              <a:spcAft>
+                <a:spcPts val="1000"/>
+              </a:spcAft>
+            </a:pPr>
+            <a:r>
+              <a:rPr lang="en-US" sz="2400" b="1" dirty="0">
+                <a:solidFill>
+                  <a:schemeClr val="bg2">
+                    <a:lumMod val="75000"/>
+                  </a:schemeClr>
+                </a:solidFill>
+                <a:ea typeface="Times New Roman" panose="02020603050405020304" pitchFamily="18" charset="0"/>
+              </a:rPr>
+              <a:t>High Level Data Processing</a:t>
+            </a:r>
+          </a:p>
+        </p:txBody>
+      </p:sp>
+      <p:pic>
+        <p:nvPicPr>
+          <p:cNvPr id="3" name="Picture 2">
+            <a:extLst>
+              <a:ext uri="{FF2B5EF4-FFF2-40B4-BE49-F238E27FC236}">
+                <a16:creationId xmlns:a16="http://schemas.microsoft.com/office/drawing/2014/main" id="{46C41653-35DD-43FB-8B04-B2D6D45EE36D}"/>
+              </a:ext>
+            </a:extLst>
+          </p:cNvPr>
+          <p:cNvPicPr>
+            <a:picLocks noChangeAspect="1"/>
+          </p:cNvPicPr>
+          <p:nvPr/>
+        </p:nvPicPr>
+        <p:blipFill>
+          <a:blip r:embed="rId3"/>
+          <a:stretch>
+            <a:fillRect/>
+          </a:stretch>
+        </p:blipFill>
+        <p:spPr>
+          <a:xfrm>
+            <a:off x="4614862" y="1613270"/>
+            <a:ext cx="2962275" cy="5057775"/>
+          </a:xfrm>
+          <a:prstGeom prst="rect">
+            <a:avLst/>
+          </a:prstGeom>
+        </p:spPr>
+      </p:pic>
+    </p:spTree>
+    <p:extLst>
+      <p:ext uri="{BB962C8B-B14F-4D97-AF65-F5344CB8AC3E}">
+        <p14:creationId xmlns:p14="http://schemas.microsoft.com/office/powerpoint/2010/main" val="4103346739"/>
+      </p:ext>
+    </p:extLst>
+  </p:cSld>
+  <p:clrMapOvr>
+    <a:masterClrMapping/>
+  </p:clrMapOvr>
+</p:sld>
+</file>
+
+<file path=ppt/slides/slide21.xml><?xml version="1.0" encoding="utf-8"?>
+<p:sld xmlns:a="http://schemas.openxmlformats.org/drawingml/2006/main" xmlns:r="http://schemas.openxmlformats.org/officeDocument/2006/relationships" xmlns:p="http://schemas.openxmlformats.org/presentationml/2006/main">
+  <p:cSld>
+    <p:spTree>
+      <p:nvGrpSpPr>
+        <p:cNvPr id="1" name=""/>
+        <p:cNvGrpSpPr/>
+        <p:nvPr/>
+      </p:nvGrpSpPr>
+      <p:grpSpPr>
+        <a:xfrm>
+          <a:off x="0" y="0"/>
+          <a:ext cx="0" cy="0"/>
+          <a:chOff x="0" y="0"/>
+          <a:chExt cx="0" cy="0"/>
+        </a:xfrm>
+      </p:grpSpPr>
+      <p:sp>
+        <p:nvSpPr>
+          <p:cNvPr id="10" name="Rectangle 9">
+            <a:extLst>
+              <a:ext uri="{FF2B5EF4-FFF2-40B4-BE49-F238E27FC236}">
+                <a16:creationId xmlns:a16="http://schemas.microsoft.com/office/drawing/2014/main" id="{C676DEBF-3901-4991-9B31-4E84BF58CA7B}"/>
+              </a:ext>
+            </a:extLst>
+          </p:cNvPr>
+          <p:cNvSpPr/>
+          <p:nvPr/>
+        </p:nvSpPr>
+        <p:spPr>
+          <a:xfrm>
+            <a:off x="0" y="1"/>
+            <a:ext cx="12192000" cy="870012"/>
+          </a:xfrm>
+          <a:prstGeom prst="rect">
+            <a:avLst/>
+          </a:prstGeom>
+          <a:solidFill>
+            <a:schemeClr val="bg1">
+              <a:lumMod val="75000"/>
+              <a:lumOff val="25000"/>
+            </a:schemeClr>
+          </a:solidFill>
+          <a:ln>
+            <a:noFill/>
+          </a:ln>
+        </p:spPr>
+        <p:style>
+          <a:lnRef idx="2">
+            <a:schemeClr val="accent1">
+              <a:shade val="50000"/>
+            </a:schemeClr>
+          </a:lnRef>
+          <a:fillRef idx="1">
+            <a:schemeClr val="accent1"/>
+          </a:fillRef>
+          <a:effectRef idx="0">
+            <a:schemeClr val="accent1"/>
+          </a:effectRef>
+          <a:fontRef idx="minor">
+            <a:schemeClr val="lt1"/>
+          </a:fontRef>
+        </p:style>
+        <p:txBody>
+          <a:bodyPr rtlCol="0" anchor="ctr"/>
+          <a:lstStyle/>
+          <a:p>
+            <a:pPr algn="ctr"/>
+            <a:endParaRPr lang="en-US"/>
+          </a:p>
+        </p:txBody>
+      </p:sp>
+      <p:sp>
+        <p:nvSpPr>
+          <p:cNvPr id="6" name="TextBox 5">
+            <a:extLst>
+              <a:ext uri="{FF2B5EF4-FFF2-40B4-BE49-F238E27FC236}">
+                <a16:creationId xmlns:a16="http://schemas.microsoft.com/office/drawing/2014/main" id="{8219429D-BCFB-4B48-8143-319EDB44DEC9}"/>
+              </a:ext>
+            </a:extLst>
+          </p:cNvPr>
+          <p:cNvSpPr txBox="1"/>
+          <p:nvPr/>
+        </p:nvSpPr>
+        <p:spPr>
+          <a:xfrm>
+            <a:off x="5931188" y="437570"/>
+            <a:ext cx="6505400" cy="369332"/>
+          </a:xfrm>
+          <a:prstGeom prst="rect">
+            <a:avLst/>
+          </a:prstGeom>
+          <a:noFill/>
+        </p:spPr>
+        <p:txBody>
+          <a:bodyPr wrap="square" rtlCol="0">
+            <a:spAutoFit/>
+          </a:bodyPr>
+          <a:lstStyle/>
+          <a:p>
+            <a:r>
+              <a:rPr lang="en-US" dirty="0">
+                <a:solidFill>
+                  <a:schemeClr val="tx1">
+                    <a:lumMod val="75000"/>
+                  </a:schemeClr>
+                </a:solidFill>
+                <a:effectLst/>
+                <a:latin typeface="Times New Roman" panose="02020603050405020304" pitchFamily="18" charset="0"/>
+                <a:ea typeface="Times New Roman" panose="02020603050405020304" pitchFamily="18" charset="0"/>
+              </a:rPr>
+              <a:t>An Integration of Machine Learning on Software Bug Reporting</a:t>
+            </a:r>
+            <a:endParaRPr lang="en-US" dirty="0">
+              <a:solidFill>
+                <a:schemeClr val="tx1">
+                  <a:lumMod val="75000"/>
+                </a:schemeClr>
+              </a:solidFill>
+            </a:endParaRPr>
+          </a:p>
+        </p:txBody>
+      </p:sp>
+      <p:sp>
+        <p:nvSpPr>
+          <p:cNvPr id="3" name="Subtitle 2">
+            <a:extLst>
+              <a:ext uri="{FF2B5EF4-FFF2-40B4-BE49-F238E27FC236}">
+                <a16:creationId xmlns:a16="http://schemas.microsoft.com/office/drawing/2014/main" id="{FA6CA051-A7FD-4745-9A72-1EADCB70415E}"/>
+              </a:ext>
+            </a:extLst>
+          </p:cNvPr>
+          <p:cNvSpPr>
+            <a:spLocks noGrp="1"/>
+          </p:cNvSpPr>
+          <p:nvPr>
+            <p:ph type="subTitle" idx="1"/>
+          </p:nvPr>
+        </p:nvSpPr>
+        <p:spPr>
+          <a:xfrm>
+            <a:off x="2695194" y="2995231"/>
+            <a:ext cx="6801612" cy="1239894"/>
+          </a:xfrm>
+        </p:spPr>
+        <p:txBody>
+          <a:bodyPr>
+            <a:normAutofit/>
+          </a:bodyPr>
+          <a:lstStyle/>
+          <a:p>
+            <a:r>
+              <a:rPr lang="en-US" sz="7200" dirty="0"/>
+              <a:t>THANK YOU</a:t>
+            </a:r>
+          </a:p>
+        </p:txBody>
+      </p:sp>
+    </p:spTree>
+    <p:extLst>
+      <p:ext uri="{BB962C8B-B14F-4D97-AF65-F5344CB8AC3E}">
+        <p14:creationId xmlns:p14="http://schemas.microsoft.com/office/powerpoint/2010/main" val="4010513584"/>
       </p:ext>
     </p:extLst>
   </p:cSld>
@@ -10870,7 +13324,7 @@
                 <a:effectLst/>
                 <a:ea typeface="Times New Roman" panose="02020603050405020304" pitchFamily="18" charset="0"/>
               </a:rPr>
-              <a:t>To categorize and train extracted data by development team using RBF (Radial Basis Function) - SVM (Support Vector Machines) algorithm.</a:t>
+              <a:t>To categorize and train extracted data by development team using Multiclass SVM (Support Vector Machines) algorithm.</a:t>
             </a:r>
           </a:p>
           <a:p>

</xml_diff>